<commit_message>
presentation about speedup 2
</commit_message>
<xml_diff>
--- a/notes/BewlSpeedup.pptx
+++ b/notes/BewlSpeedup.pptx
@@ -9218,7 +9218,7 @@
               </a:lnSpc>
             </a:pPr>
             <a:r>
-              <a:rPr b="0" lang="en-GB" sz="4400" spc="-1" strike="noStrike">
+              <a:rPr b="0" lang="en-GB" sz="3200" spc="-1" strike="noStrike">
                 <a:solidFill>
                   <a:srgbClr val="000000"/>
                 </a:solidFill>
@@ -9230,9 +9230,9 @@
                 <a:latin typeface="Arial"/>
                 <a:ea typeface="DejaVu Sans"/>
               </a:rPr>
-              <a:t>A paper about the connections between music and topos theory</a:t>
-            </a:r>
-            <a:endParaRPr b="0" lang="en-GB" sz="1800" spc="-1" strike="noStrike">
+              <a:t>The link between music and topos theory</a:t>
+            </a:r>
+            <a:endParaRPr b="0" lang="en-GB" sz="3200" spc="-1" strike="noStrike">
               <a:solidFill>
                 <a:srgbClr val="000000"/>
               </a:solidFill>
@@ -9254,7 +9254,7 @@
         </p:nvSpPr>
         <p:spPr>
           <a:xfrm>
-            <a:off x="504000" y="1769040"/>
+            <a:off x="360000" y="1304280"/>
             <a:ext cx="9070920" cy="4383720"/>
           </a:xfrm>
           <a:prstGeom prst="rect">
@@ -9297,7 +9297,40 @@
                 <a:latin typeface="Arial"/>
                 <a:ea typeface="DejaVu Sans"/>
               </a:rPr>
-              <a:t>Thomas Noll, “The Topos of Triads”</a:t>
+              <a:t> </a:t>
+            </a:r>
+            <a:endParaRPr b="0" lang="en-GB" sz="2400" spc="-1" strike="noStrike">
+              <a:solidFill>
+                <a:srgbClr val="000000"/>
+              </a:solidFill>
+              <a:uFill>
+                <a:solidFill>
+                  <a:srgbClr val="ffffff"/>
+                </a:solidFill>
+              </a:uFill>
+              <a:latin typeface="Arial"/>
+            </a:endParaRPr>
+          </a:p>
+          <a:p>
+            <a:pPr>
+              <a:lnSpc>
+                <a:spcPct val="100000"/>
+              </a:lnSpc>
+            </a:pPr>
+            <a:r>
+              <a:rPr b="0" lang="en-GB" sz="2200" spc="-1" strike="noStrike">
+                <a:solidFill>
+                  <a:srgbClr val="000000"/>
+                </a:solidFill>
+                <a:uFill>
+                  <a:solidFill>
+                    <a:srgbClr val="ffffff"/>
+                  </a:solidFill>
+                </a:uFill>
+                <a:latin typeface="Arial"/>
+                <a:ea typeface="DejaVu Sans"/>
+              </a:rPr>
+              <a:t>Thomas Noll, “The Topos of Triads” 2005</a:t>
             </a:r>
             <a:endParaRPr b="0" lang="en-GB" sz="2400" spc="-1" strike="noStrike">
               <a:solidFill>
@@ -9336,7 +9369,7 @@
               </a:lnSpc>
             </a:pPr>
             <a:r>
-              <a:rPr b="0" lang="en-GB" sz="2400" spc="-1" strike="noStrike">
+              <a:rPr b="0" lang="en-GB" sz="2200" spc="-1" strike="noStrike">
                 <a:solidFill>
                   <a:srgbClr val="000000"/>
                 </a:solidFill>
@@ -9351,7 +9384,7 @@
               <a:t>Start by considering the </a:t>
             </a:r>
             <a:r>
-              <a:rPr b="1" i="1" lang="en-GB" sz="2400" spc="-1" strike="noStrike">
+              <a:rPr b="1" i="1" lang="en-GB" sz="2200" spc="-1" strike="noStrike">
                 <a:solidFill>
                   <a:srgbClr val="000000"/>
                 </a:solidFill>
@@ -9366,7 +9399,7 @@
               <a:t>octave</a:t>
             </a:r>
             <a:r>
-              <a:rPr b="0" lang="en-GB" sz="2400" spc="-1" strike="noStrike">
+              <a:rPr b="0" lang="en-GB" sz="2200" spc="-1" strike="noStrike">
                 <a:solidFill>
                   <a:srgbClr val="000000"/>
                 </a:solidFill>
@@ -9417,7 +9450,7 @@
               </a:lnSpc>
             </a:pPr>
             <a:r>
-              <a:rPr b="0" lang="en-GB" sz="2400" spc="-1" strike="noStrike">
+              <a:rPr b="0" lang="en-GB" sz="2200" spc="-1" strike="noStrike">
                 <a:solidFill>
                   <a:srgbClr val="000000"/>
                 </a:solidFill>
@@ -9468,7 +9501,7 @@
               </a:lnSpc>
             </a:pPr>
             <a:r>
-              <a:rPr b="0" lang="en-GB" sz="2400" spc="-1" strike="noStrike">
+              <a:rPr b="0" lang="en-GB" sz="2200" spc="-1" strike="noStrike">
                 <a:solidFill>
                   <a:srgbClr val="000000"/>
                 </a:solidFill>
@@ -9483,7 +9516,7 @@
               <a:t>They also need to preserve the </a:t>
             </a:r>
             <a:r>
-              <a:rPr b="1" i="1" lang="en-GB" sz="2400" spc="-1" strike="noStrike">
+              <a:rPr b="1" i="1" lang="en-GB" sz="2200" spc="-1" strike="noStrike">
                 <a:solidFill>
                   <a:srgbClr val="000000"/>
                 </a:solidFill>
@@ -9498,7 +9531,7 @@
               <a:t>affine structure</a:t>
             </a:r>
             <a:r>
-              <a:rPr b="0" lang="en-GB" sz="2400" spc="-1" strike="noStrike">
+              <a:rPr b="0" lang="en-GB" sz="2200" spc="-1" strike="noStrike">
                 <a:solidFill>
                   <a:srgbClr val="000000"/>
                 </a:solidFill>
@@ -9549,7 +9582,7 @@
               </a:lnSpc>
             </a:pPr>
             <a:r>
-              <a:rPr b="0" lang="en-GB" sz="2400" spc="-1" strike="noStrike">
+              <a:rPr b="0" lang="en-GB" sz="2200" spc="-1" strike="noStrike">
                 <a:solidFill>
                   <a:srgbClr val="000000"/>
                 </a:solidFill>
@@ -9561,7 +9594,7 @@
                 <a:latin typeface="Arial"/>
                 <a:ea typeface="DejaVu Sans"/>
               </a:rPr>
-              <a:t>There are precisely 8 such transformations - including the identity, which leaves every note of the octave fixed.</a:t>
+              <a:t>There are precisely 8 such transformations - including the identity, which leaves every note of the octave fixed. </a:t>
             </a:r>
             <a:endParaRPr b="0" lang="en-GB" sz="2400" spc="-1" strike="noStrike">
               <a:solidFill>
@@ -9594,19 +9627,13 @@
             </a:endParaRPr>
           </a:p>
           <a:p>
-            <a:pPr marL="432000" indent="-323280">
+            <a:pPr>
               <a:lnSpc>
                 <a:spcPct val="100000"/>
               </a:lnSpc>
-              <a:buClr>
-                <a:srgbClr val="000000"/>
-              </a:buClr>
-              <a:buSzPct val="45000"/>
-              <a:buFont typeface="Wingdings" charset="2"/>
-              <a:buChar char=""/>
             </a:pPr>
             <a:r>
-              <a:rPr b="0" lang="en-GB" sz="2400" spc="-1" strike="noStrike">
+              <a:rPr b="0" lang="en-GB" sz="2200" spc="-1" strike="noStrike">
                 <a:solidFill>
                   <a:srgbClr val="000000"/>
                 </a:solidFill>
@@ -9618,7 +9645,7 @@
                 <a:latin typeface="Arial"/>
                 <a:ea typeface="DejaVu Sans"/>
               </a:rPr>
-              <a:t> </a:t>
+              <a:t>How do they look?</a:t>
             </a:r>
             <a:endParaRPr b="0" lang="en-GB" sz="2400" spc="-1" strike="noStrike">
               <a:solidFill>
@@ -14685,7 +14712,67 @@
                 <a:latin typeface="Arial"/>
                 <a:ea typeface="DejaVu Sans"/>
               </a:rPr>
-              <a:t>By construction, we can multiply notes of the octave by elements of T.  For example, Bb times 1 is Bb.</a:t>
+              <a:t>By construction, we can multiply notes of the octave by elements of T.  For example, B</a:t>
+            </a:r>
+            <a:r>
+              <a:rPr b="0" lang="en-GB" sz="2200" spc="-1" strike="noStrike">
+                <a:solidFill>
+                  <a:srgbClr val="000000"/>
+                </a:solidFill>
+                <a:uFill>
+                  <a:solidFill>
+                    <a:srgbClr val="ffffff"/>
+                  </a:solidFill>
+                </a:uFill>
+                <a:latin typeface="Arial"/>
+                <a:ea typeface="DejaVu Sans"/>
+              </a:rPr>
+              <a:t>♭</a:t>
+            </a:r>
+            <a:r>
+              <a:rPr b="0" lang="en-GB" sz="2200" spc="-1" strike="noStrike">
+                <a:solidFill>
+                  <a:srgbClr val="000000"/>
+                </a:solidFill>
+                <a:uFill>
+                  <a:solidFill>
+                    <a:srgbClr val="ffffff"/>
+                  </a:solidFill>
+                </a:uFill>
+                <a:latin typeface="Arial"/>
+                <a:ea typeface="DejaVu Sans"/>
+              </a:rPr>
+              <a:t> times 1 is B♭ ; </a:t>
+            </a:r>
+            <a:r>
+              <a:rPr b="0" lang="en-GB" sz="2200" spc="-1" strike="noStrike">
+                <a:solidFill>
+                  <a:srgbClr val="000000"/>
+                </a:solidFill>
+                <a:uFill>
+                  <a:solidFill>
+                    <a:srgbClr val="ffffff"/>
+                  </a:solidFill>
+                </a:uFill>
+                <a:latin typeface="Arial"/>
+                <a:ea typeface="DejaVu Sans"/>
+              </a:rPr>
+              <a:t>B♭ times a is C</a:t>
+            </a:r>
+            <a:r>
+              <a:rPr b="0" lang="en-GB" sz="2200" spc="-1" strike="noStrike">
+                <a:solidFill>
+                  <a:srgbClr val="000000"/>
+                </a:solidFill>
+                <a:uFill>
+                  <a:solidFill>
+                    <a:srgbClr val="ffffff"/>
+                  </a:solidFill>
+                </a:uFill>
+                <a:latin typeface="Arial"/>
+                <a:ea typeface="DejaVu Sans"/>
+              </a:rPr>
+              <a:t>♮.</a:t>
             </a:r>
             <a:endParaRPr b="0" lang="en-GB" sz="1800" spc="-1" strike="noStrike">
               <a:solidFill>
@@ -14726,7 +14813,7 @@
                 <a:latin typeface="Arial"/>
                 <a:ea typeface="DejaVu Sans"/>
               </a:rPr>
-              <a:t>So the octave is a sort of vector space over T, just as you can multiply vectors by real numbers. It’s like working with vectors, only there is no addition! These ‘actions of T by right multiplication’ are called </a:t>
+              <a:t>So the octave is a sort of vector space over T. (As you may remember, vectors can be multiplied by real numbers.) It’s like working with vectors, only there is no addition! These ‘(multiplicative) actions of T’ are called </a:t>
             </a:r>
             <a:r>
               <a:rPr b="1" lang="en-GB" sz="2200" spc="-1" strike="noStrike">

</xml_diff>

<commit_message>
presentation about speedup 3
</commit_message>
<xml_diff>
--- a/notes/BewlSpeedup.pptx
+++ b/notes/BewlSpeedup.pptx
@@ -4674,7 +4674,7 @@
         </p:nvSpPr>
         <p:spPr>
           <a:xfrm>
-            <a:off x="864000" y="1872000"/>
+            <a:off x="792360" y="1377720"/>
             <a:ext cx="8711640" cy="5246280"/>
           </a:xfrm>
           <a:prstGeom prst="rect">
@@ -9274,31 +9274,11 @@
         <p:txBody>
           <a:bodyPr lIns="0" rIns="0" tIns="0" bIns="0"/>
           <a:p>
-            <a:pPr marL="432000" indent="-323280">
+            <a:pPr>
               <a:lnSpc>
                 <a:spcPct val="100000"/>
               </a:lnSpc>
-              <a:buClr>
-                <a:srgbClr val="000000"/>
-              </a:buClr>
-              <a:buFont typeface="Wingdings" charset="2"/>
-              <a:buChar char=""/>
             </a:pPr>
-            <a:r>
-              <a:rPr b="0" lang="en-GB" sz="2400" spc="-1" strike="noStrike">
-                <a:solidFill>
-                  <a:srgbClr val="000000"/>
-                </a:solidFill>
-                <a:uFill>
-                  <a:solidFill>
-                    <a:srgbClr val="ffffff"/>
-                  </a:solidFill>
-                </a:uFill>
-                <a:latin typeface="Arial"/>
-                <a:ea typeface="DejaVu Sans"/>
-              </a:rPr>
-              <a:t> </a:t>
-            </a:r>
             <a:endParaRPr b="0" lang="en-GB" sz="2400" spc="-1" strike="noStrike">
               <a:solidFill>
                 <a:srgbClr val="000000"/>
@@ -9811,7 +9791,7 @@
           <p:nvPr/>
         </p:nvGraphicFramePr>
         <p:xfrm>
-          <a:off x="2492280" y="212760"/>
+          <a:off x="2461320" y="93240"/>
           <a:ext cx="5243400" cy="6975360"/>
         </p:xfrm>
         <a:graphic>
@@ -16290,7 +16270,22 @@
                 <a:latin typeface="Arial"/>
                 <a:ea typeface="DejaVu Sans"/>
               </a:rPr>
-              <a:t> fails</a:t>
+              <a:t> fails. Also </a:t>
+            </a:r>
+            <a:r>
+              <a:rPr b="1" lang="en-GB" sz="2600" spc="-1" strike="noStrike">
+                <a:solidFill>
+                  <a:srgbClr val="000000"/>
+                </a:solidFill>
+                <a:uFill>
+                  <a:solidFill>
+                    <a:srgbClr val="ffffff"/>
+                  </a:solidFill>
+                </a:uFill>
+                <a:latin typeface="Arial"/>
+                <a:ea typeface="DejaVu Sans"/>
+              </a:rPr>
+              <a:t>¬¬a != a</a:t>
             </a:r>
             <a:endParaRPr b="0" lang="en-GB" sz="1800" spc="-1" strike="noStrike">
               <a:solidFill>
@@ -16587,6 +16582,19 @@
               </a:rPr>
               <a:t>I can only just run the unit tests </a:t>
             </a:r>
+            <a:endParaRPr b="0" lang="en-GB" sz="1800" spc="-1" strike="noStrike">
+              <a:solidFill>
+                <a:srgbClr val="000000"/>
+              </a:solidFill>
+              <a:uFill>
+                <a:solidFill>
+                  <a:srgbClr val="ffffff"/>
+                </a:solidFill>
+              </a:uFill>
+              <a:latin typeface="Arial"/>
+            </a:endParaRPr>
+          </a:p>
+          <a:p>
             <a:endParaRPr b="0" lang="en-GB" sz="1800" spc="-1" strike="noStrike">
               <a:solidFill>
                 <a:srgbClr val="000000"/>
@@ -19137,181 +19145,61 @@
             </a:endParaRPr>
           </a:p>
           <a:p>
-            <a:pPr marL="216000" indent="-216000">
-              <a:buClr>
-                <a:srgbClr val="000000"/>
-              </a:buClr>
-              <a:buSzPct val="45000"/>
-              <a:buFont typeface="Wingdings" charset="2"/>
-              <a:buChar char=""/>
-            </a:pPr>
-            <a:r>
-              <a:rPr b="0" lang="en-GB" sz="1800" spc="-1" strike="noStrike">
-                <a:solidFill>
-                  <a:srgbClr val="000000"/>
-                </a:solidFill>
-                <a:uFill>
-                  <a:solidFill>
-                    <a:srgbClr val="ffffff"/>
-                  </a:solidFill>
-                </a:uFill>
-                <a:latin typeface="Arial"/>
-              </a:rPr>
-              <a:t>E</a:t>
-            </a:r>
-            <a:r>
-              <a:rPr b="0" lang="en-GB" sz="1800" spc="-1" strike="noStrike">
-                <a:solidFill>
-                  <a:srgbClr val="000000"/>
-                </a:solidFill>
-                <a:uFill>
-                  <a:solidFill>
-                    <a:srgbClr val="ffffff"/>
-                  </a:solidFill>
-                </a:uFill>
-                <a:latin typeface="Arial"/>
-              </a:rPr>
-              <a:t>x</a:t>
-            </a:r>
-            <a:r>
-              <a:rPr b="0" lang="en-GB" sz="1800" spc="-1" strike="noStrike">
-                <a:solidFill>
-                  <a:srgbClr val="000000"/>
-                </a:solidFill>
-                <a:uFill>
-                  <a:solidFill>
-                    <a:srgbClr val="ffffff"/>
-                  </a:solidFill>
-                </a:uFill>
-                <a:latin typeface="Arial"/>
-              </a:rPr>
-              <a:t>p</a:t>
-            </a:r>
-            <a:r>
-              <a:rPr b="0" lang="en-GB" sz="1800" spc="-1" strike="noStrike">
-                <a:solidFill>
-                  <a:srgbClr val="000000"/>
-                </a:solidFill>
-                <a:uFill>
-                  <a:solidFill>
-                    <a:srgbClr val="ffffff"/>
-                  </a:solidFill>
-                </a:uFill>
-                <a:latin typeface="Arial"/>
-              </a:rPr>
-              <a:t>o</a:t>
-            </a:r>
-            <a:r>
-              <a:rPr b="0" lang="en-GB" sz="1800" spc="-1" strike="noStrike">
-                <a:solidFill>
-                  <a:srgbClr val="000000"/>
-                </a:solidFill>
-                <a:uFill>
-                  <a:solidFill>
-                    <a:srgbClr val="ffffff"/>
-                  </a:solidFill>
-                </a:uFill>
-                <a:latin typeface="Arial"/>
-              </a:rPr>
-              <a:t>n</a:t>
-            </a:r>
-            <a:r>
-              <a:rPr b="0" lang="en-GB" sz="1800" spc="-1" strike="noStrike">
-                <a:solidFill>
-                  <a:srgbClr val="000000"/>
-                </a:solidFill>
-                <a:uFill>
-                  <a:solidFill>
-                    <a:srgbClr val="ffffff"/>
-                  </a:solidFill>
-                </a:uFill>
-                <a:latin typeface="Arial"/>
-              </a:rPr>
-              <a:t>e</a:t>
-            </a:r>
-            <a:r>
-              <a:rPr b="0" lang="en-GB" sz="1800" spc="-1" strike="noStrike">
-                <a:solidFill>
-                  <a:srgbClr val="000000"/>
-                </a:solidFill>
-                <a:uFill>
-                  <a:solidFill>
-                    <a:srgbClr val="ffffff"/>
-                  </a:solidFill>
-                </a:uFill>
-                <a:latin typeface="Arial"/>
-              </a:rPr>
-              <a:t>n</a:t>
-            </a:r>
-            <a:r>
-              <a:rPr b="0" lang="en-GB" sz="1800" spc="-1" strike="noStrike">
-                <a:solidFill>
-                  <a:srgbClr val="000000"/>
-                </a:solidFill>
-                <a:uFill>
-                  <a:solidFill>
-                    <a:srgbClr val="ffffff"/>
-                  </a:solidFill>
-                </a:uFill>
-                <a:latin typeface="Arial"/>
-              </a:rPr>
-              <a:t>ti</a:t>
-            </a:r>
-            <a:r>
-              <a:rPr b="0" lang="en-GB" sz="1800" spc="-1" strike="noStrike">
-                <a:solidFill>
-                  <a:srgbClr val="000000"/>
-                </a:solidFill>
-                <a:uFill>
-                  <a:solidFill>
-                    <a:srgbClr val="ffffff"/>
-                  </a:solidFill>
-                </a:uFill>
-                <a:latin typeface="Arial"/>
-              </a:rPr>
-              <a:t>a</a:t>
-            </a:r>
-            <a:r>
-              <a:rPr b="0" lang="en-GB" sz="1800" spc="-1" strike="noStrike">
-                <a:solidFill>
-                  <a:srgbClr val="000000"/>
-                </a:solidFill>
-                <a:uFill>
-                  <a:solidFill>
-                    <a:srgbClr val="ffffff"/>
-                  </a:solidFill>
-                </a:uFill>
-                <a:latin typeface="Arial"/>
-              </a:rPr>
-              <a:t>ti</a:t>
-            </a:r>
-            <a:r>
-              <a:rPr b="0" lang="en-GB" sz="1800" spc="-1" strike="noStrike">
-                <a:solidFill>
-                  <a:srgbClr val="000000"/>
-                </a:solidFill>
-                <a:uFill>
-                  <a:solidFill>
-                    <a:srgbClr val="ffffff"/>
-                  </a:solidFill>
-                </a:uFill>
-                <a:latin typeface="Arial"/>
-              </a:rPr>
-              <a:t>o</a:t>
-            </a:r>
-            <a:r>
-              <a:rPr b="0" lang="en-GB" sz="1800" spc="-1" strike="noStrike">
-                <a:solidFill>
-                  <a:srgbClr val="000000"/>
-                </a:solidFill>
-                <a:uFill>
-                  <a:solidFill>
-                    <a:srgbClr val="ffffff"/>
-                  </a:solidFill>
-                </a:uFill>
-                <a:latin typeface="Arial"/>
-              </a:rPr>
-              <a:t>n </a:t>
+            <a:r>
+              <a:rPr b="0" lang="en-GB" sz="1800" spc="-1" strike="noStrike">
+                <a:solidFill>
+                  <a:srgbClr val="000000"/>
+                </a:solidFill>
+                <a:uFill>
+                  <a:solidFill>
+                    <a:srgbClr val="ffffff"/>
+                  </a:solidFill>
+                </a:uFill>
+                <a:latin typeface="Arial"/>
+              </a:rPr>
+              <a:t>Exp</a:t>
+            </a:r>
+            <a:r>
+              <a:rPr b="0" lang="en-GB" sz="1800" spc="-1" strike="noStrike">
+                <a:solidFill>
+                  <a:srgbClr val="000000"/>
+                </a:solidFill>
+                <a:uFill>
+                  <a:solidFill>
+                    <a:srgbClr val="ffffff"/>
+                  </a:solidFill>
+                </a:uFill>
+                <a:latin typeface="Arial"/>
+              </a:rPr>
+              <a:t>one</a:t>
+            </a:r>
+            <a:r>
+              <a:rPr b="0" lang="en-GB" sz="1800" spc="-1" strike="noStrike">
+                <a:solidFill>
+                  <a:srgbClr val="000000"/>
+                </a:solidFill>
+                <a:uFill>
+                  <a:solidFill>
+                    <a:srgbClr val="ffffff"/>
+                  </a:solidFill>
+                </a:uFill>
+                <a:latin typeface="Arial"/>
+              </a:rPr>
+              <a:t>ntia</a:t>
+            </a:r>
+            <a:r>
+              <a:rPr b="0" lang="en-GB" sz="1800" spc="-1" strike="noStrike">
+                <a:solidFill>
+                  <a:srgbClr val="000000"/>
+                </a:solidFill>
+                <a:uFill>
+                  <a:solidFill>
+                    <a:srgbClr val="ffffff"/>
+                  </a:solidFill>
+                </a:uFill>
+                <a:latin typeface="Arial"/>
+              </a:rPr>
+              <a:t>tion </a:t>
             </a:r>
             <a:r>
               <a:rPr b="0" lang="en-GB" sz="1800" spc="-1" strike="noStrike">
@@ -19339,77 +19227,21 @@
                 </a:uFill>
                 <a:latin typeface="Arial"/>
               </a:rPr>
-              <a:t>t</a:t>
-            </a:r>
-            <a:r>
-              <a:rPr b="0" lang="en-GB" sz="1800" spc="-1" strike="noStrike">
-                <a:solidFill>
-                  <a:srgbClr val="000000"/>
-                </a:solidFill>
-                <a:uFill>
-                  <a:solidFill>
-                    <a:srgbClr val="ffffff"/>
-                  </a:solidFill>
-                </a:uFill>
-                <a:latin typeface="Arial"/>
-              </a:rPr>
-              <a:t>h</a:t>
-            </a:r>
-            <a:r>
-              <a:rPr b="0" lang="en-GB" sz="1800" spc="-1" strike="noStrike">
-                <a:solidFill>
-                  <a:srgbClr val="000000"/>
-                </a:solidFill>
-                <a:uFill>
-                  <a:solidFill>
-                    <a:srgbClr val="ffffff"/>
-                  </a:solidFill>
-                </a:uFill>
-                <a:latin typeface="Arial"/>
-              </a:rPr>
-              <a:t>e </a:t>
-            </a:r>
-            <a:r>
-              <a:rPr b="0" lang="en-GB" sz="1800" spc="-1" strike="noStrike">
-                <a:solidFill>
-                  <a:srgbClr val="000000"/>
-                </a:solidFill>
-                <a:uFill>
-                  <a:solidFill>
-                    <a:srgbClr val="ffffff"/>
-                  </a:solidFill>
-                </a:uFill>
-                <a:latin typeface="Arial"/>
-              </a:rPr>
-              <a:t>t</a:t>
-            </a:r>
-            <a:r>
-              <a:rPr b="0" lang="en-GB" sz="1800" spc="-1" strike="noStrike">
-                <a:solidFill>
-                  <a:srgbClr val="000000"/>
-                </a:solidFill>
-                <a:uFill>
-                  <a:solidFill>
-                    <a:srgbClr val="ffffff"/>
-                  </a:solidFill>
-                </a:uFill>
-                <a:latin typeface="Arial"/>
-              </a:rPr>
-              <a:t>hi</a:t>
-            </a:r>
-            <a:r>
-              <a:rPr b="0" lang="en-GB" sz="1800" spc="-1" strike="noStrike">
-                <a:solidFill>
-                  <a:srgbClr val="000000"/>
-                </a:solidFill>
-                <a:uFill>
-                  <a:solidFill>
-                    <a:srgbClr val="ffffff"/>
-                  </a:solidFill>
-                </a:uFill>
-                <a:latin typeface="Arial"/>
-              </a:rPr>
-              <a:t>r</a:t>
+              <a:t>the </a:t>
+            </a:r>
+            <a:r>
+              <a:rPr b="0" lang="en-GB" sz="1800" spc="-1" strike="noStrike">
+                <a:solidFill>
+                  <a:srgbClr val="000000"/>
+                </a:solidFill>
+                <a:uFill>
+                  <a:solidFill>
+                    <a:srgbClr val="ffffff"/>
+                  </a:solidFill>
+                </a:uFill>
+                <a:latin typeface="Arial"/>
+              </a:rPr>
+              <a:t>thir</a:t>
             </a:r>
             <a:r>
               <a:rPr b="0" lang="en-GB" sz="1800" spc="-1" strike="noStrike">
@@ -19437,105 +19269,35 @@
                 </a:uFill>
                 <a:latin typeface="Arial"/>
               </a:rPr>
-              <a:t>o</a:t>
-            </a:r>
-            <a:r>
-              <a:rPr b="0" lang="en-GB" sz="1800" spc="-1" strike="noStrike">
-                <a:solidFill>
-                  <a:srgbClr val="000000"/>
-                </a:solidFill>
-                <a:uFill>
-                  <a:solidFill>
-                    <a:srgbClr val="ffffff"/>
-                  </a:solidFill>
-                </a:uFill>
-                <a:latin typeface="Arial"/>
-              </a:rPr>
-              <a:t>p</a:t>
-            </a:r>
-            <a:r>
-              <a:rPr b="0" lang="en-GB" sz="1800" spc="-1" strike="noStrike">
-                <a:solidFill>
-                  <a:srgbClr val="000000"/>
-                </a:solidFill>
-                <a:uFill>
-                  <a:solidFill>
-                    <a:srgbClr val="ffffff"/>
-                  </a:solidFill>
-                </a:uFill>
-                <a:latin typeface="Arial"/>
-              </a:rPr>
-              <a:t>e</a:t>
-            </a:r>
-            <a:r>
-              <a:rPr b="0" lang="en-GB" sz="1800" spc="-1" strike="noStrike">
-                <a:solidFill>
-                  <a:srgbClr val="000000"/>
-                </a:solidFill>
-                <a:uFill>
-                  <a:solidFill>
-                    <a:srgbClr val="ffffff"/>
-                  </a:solidFill>
-                </a:uFill>
-                <a:latin typeface="Arial"/>
-              </a:rPr>
-              <a:t>r</a:t>
-            </a:r>
-            <a:r>
-              <a:rPr b="0" lang="en-GB" sz="1800" spc="-1" strike="noStrike">
-                <a:solidFill>
-                  <a:srgbClr val="000000"/>
-                </a:solidFill>
-                <a:uFill>
-                  <a:solidFill>
-                    <a:srgbClr val="ffffff"/>
-                  </a:solidFill>
-                </a:uFill>
-                <a:latin typeface="Arial"/>
-              </a:rPr>
-              <a:t>a</a:t>
-            </a:r>
-            <a:r>
-              <a:rPr b="0" lang="en-GB" sz="1800" spc="-1" strike="noStrike">
-                <a:solidFill>
-                  <a:srgbClr val="000000"/>
-                </a:solidFill>
-                <a:uFill>
-                  <a:solidFill>
-                    <a:srgbClr val="ffffff"/>
-                  </a:solidFill>
-                </a:uFill>
-                <a:latin typeface="Arial"/>
-              </a:rPr>
-              <a:t>ti</a:t>
-            </a:r>
-            <a:r>
-              <a:rPr b="0" lang="en-GB" sz="1800" spc="-1" strike="noStrike">
-                <a:solidFill>
-                  <a:srgbClr val="000000"/>
-                </a:solidFill>
-                <a:uFill>
-                  <a:solidFill>
-                    <a:srgbClr val="ffffff"/>
-                  </a:solidFill>
-                </a:uFill>
-                <a:latin typeface="Arial"/>
-              </a:rPr>
-              <a:t>o</a:t>
-            </a:r>
-            <a:r>
-              <a:rPr b="0" lang="en-GB" sz="1800" spc="-1" strike="noStrike">
-                <a:solidFill>
-                  <a:srgbClr val="000000"/>
-                </a:solidFill>
-                <a:uFill>
-                  <a:solidFill>
-                    <a:srgbClr val="ffffff"/>
-                  </a:solidFill>
-                </a:uFill>
-                <a:latin typeface="Arial"/>
-              </a:rPr>
-              <a:t>n </a:t>
+              <a:t>ope</a:t>
+            </a:r>
+            <a:r>
+              <a:rPr b="0" lang="en-GB" sz="1800" spc="-1" strike="noStrike">
+                <a:solidFill>
+                  <a:srgbClr val="000000"/>
+                </a:solidFill>
+                <a:uFill>
+                  <a:solidFill>
+                    <a:srgbClr val="ffffff"/>
+                  </a:solidFill>
+                </a:uFill>
+                <a:latin typeface="Arial"/>
+              </a:rPr>
+              <a:t>rati</a:t>
+            </a:r>
+            <a:r>
+              <a:rPr b="0" lang="en-GB" sz="1800" spc="-1" strike="noStrike">
+                <a:solidFill>
+                  <a:srgbClr val="000000"/>
+                </a:solidFill>
+                <a:uFill>
+                  <a:solidFill>
+                    <a:srgbClr val="ffffff"/>
+                  </a:solidFill>
+                </a:uFill>
+                <a:latin typeface="Arial"/>
+              </a:rPr>
+              <a:t>on </a:t>
             </a:r>
             <a:r>
               <a:rPr b="0" lang="en-GB" sz="1800" spc="-1" strike="noStrike">
@@ -19563,217 +19325,77 @@
                 </a:uFill>
                 <a:latin typeface="Arial"/>
               </a:rPr>
-              <a:t>t</a:t>
-            </a:r>
-            <a:r>
-              <a:rPr b="0" lang="en-GB" sz="1800" spc="-1" strike="noStrike">
-                <a:solidFill>
-                  <a:srgbClr val="000000"/>
-                </a:solidFill>
-                <a:uFill>
-                  <a:solidFill>
-                    <a:srgbClr val="ffffff"/>
-                  </a:solidFill>
-                </a:uFill>
-                <a:latin typeface="Arial"/>
-              </a:rPr>
-              <a:t>h</a:t>
-            </a:r>
-            <a:r>
-              <a:rPr b="0" lang="en-GB" sz="1800" spc="-1" strike="noStrike">
-                <a:solidFill>
-                  <a:srgbClr val="000000"/>
-                </a:solidFill>
-                <a:uFill>
-                  <a:solidFill>
-                    <a:srgbClr val="ffffff"/>
-                  </a:solidFill>
-                </a:uFill>
-                <a:latin typeface="Arial"/>
-              </a:rPr>
-              <a:t>e </a:t>
-            </a:r>
-            <a:r>
-              <a:rPr b="0" lang="en-GB" sz="1800" spc="-1" strike="noStrike">
-                <a:solidFill>
-                  <a:srgbClr val="000000"/>
-                </a:solidFill>
-                <a:uFill>
-                  <a:solidFill>
-                    <a:srgbClr val="ffffff"/>
-                  </a:solidFill>
-                </a:uFill>
-                <a:latin typeface="Arial"/>
-              </a:rPr>
-              <a:t>q</a:t>
-            </a:r>
-            <a:r>
-              <a:rPr b="0" lang="en-GB" sz="1800" spc="-1" strike="noStrike">
-                <a:solidFill>
-                  <a:srgbClr val="000000"/>
-                </a:solidFill>
-                <a:uFill>
-                  <a:solidFill>
-                    <a:srgbClr val="ffffff"/>
-                  </a:solidFill>
-                </a:uFill>
-                <a:latin typeface="Arial"/>
-              </a:rPr>
-              <a:t>u</a:t>
-            </a:r>
-            <a:r>
-              <a:rPr b="0" lang="en-GB" sz="1800" spc="-1" strike="noStrike">
-                <a:solidFill>
-                  <a:srgbClr val="000000"/>
-                </a:solidFill>
-                <a:uFill>
-                  <a:solidFill>
-                    <a:srgbClr val="ffffff"/>
-                  </a:solidFill>
-                </a:uFill>
-                <a:latin typeface="Arial"/>
-              </a:rPr>
-              <a:t>a</a:t>
-            </a:r>
-            <a:r>
-              <a:rPr b="0" lang="en-GB" sz="1800" spc="-1" strike="noStrike">
-                <a:solidFill>
-                  <a:srgbClr val="000000"/>
-                </a:solidFill>
-                <a:uFill>
-                  <a:solidFill>
-                    <a:srgbClr val="ffffff"/>
-                  </a:solidFill>
-                </a:uFill>
-                <a:latin typeface="Arial"/>
-              </a:rPr>
-              <a:t>rt</a:t>
-            </a:r>
-            <a:r>
-              <a:rPr b="0" lang="en-GB" sz="1800" spc="-1" strike="noStrike">
-                <a:solidFill>
-                  <a:srgbClr val="000000"/>
-                </a:solidFill>
-                <a:uFill>
-                  <a:solidFill>
-                    <a:srgbClr val="ffffff"/>
-                  </a:solidFill>
-                </a:uFill>
-                <a:latin typeface="Arial"/>
-              </a:rPr>
-              <a:t>e</a:t>
-            </a:r>
-            <a:r>
-              <a:rPr b="0" lang="en-GB" sz="1800" spc="-1" strike="noStrike">
-                <a:solidFill>
-                  <a:srgbClr val="000000"/>
-                </a:solidFill>
-                <a:uFill>
-                  <a:solidFill>
-                    <a:srgbClr val="ffffff"/>
-                  </a:solidFill>
-                </a:uFill>
-                <a:latin typeface="Arial"/>
-              </a:rPr>
-              <a:t>t </a:t>
-            </a:r>
-            <a:r>
-              <a:rPr b="0" lang="en-GB" sz="1800" spc="-1" strike="noStrike">
-                <a:solidFill>
-                  <a:srgbClr val="000000"/>
-                </a:solidFill>
-                <a:uFill>
-                  <a:solidFill>
-                    <a:srgbClr val="ffffff"/>
-                  </a:solidFill>
-                </a:uFill>
-                <a:latin typeface="Arial"/>
-              </a:rPr>
-              <a:t>(</a:t>
-            </a:r>
-            <a:r>
-              <a:rPr b="0" lang="en-GB" sz="1800" spc="-1" strike="noStrike">
-                <a:solidFill>
-                  <a:srgbClr val="000000"/>
-                </a:solidFill>
-                <a:uFill>
-                  <a:solidFill>
-                    <a:srgbClr val="ffffff"/>
-                  </a:solidFill>
-                </a:uFill>
-                <a:latin typeface="Arial"/>
-              </a:rPr>
-              <a:t>+</a:t>
-            </a:r>
-            <a:r>
-              <a:rPr b="0" lang="en-GB" sz="1800" spc="-1" strike="noStrike">
-                <a:solidFill>
-                  <a:srgbClr val="000000"/>
-                </a:solidFill>
-                <a:uFill>
-                  <a:solidFill>
-                    <a:srgbClr val="ffffff"/>
-                  </a:solidFill>
-                </a:uFill>
-                <a:latin typeface="Arial"/>
-              </a:rPr>
-              <a:t>, </a:t>
-            </a:r>
-            <a:r>
-              <a:rPr b="0" lang="en-GB" sz="1800" spc="-1" strike="noStrike">
-                <a:solidFill>
-                  <a:srgbClr val="000000"/>
-                </a:solidFill>
-                <a:uFill>
-                  <a:solidFill>
-                    <a:srgbClr val="ffffff"/>
-                  </a:solidFill>
-                </a:uFill>
-                <a:latin typeface="Arial"/>
-              </a:rPr>
-              <a:t>*, </a:t>
-            </a:r>
-            <a:r>
-              <a:rPr b="0" lang="en-GB" sz="1800" spc="-1" strike="noStrike">
-                <a:solidFill>
-                  <a:srgbClr val="000000"/>
-                </a:solidFill>
-                <a:uFill>
-                  <a:solidFill>
-                    <a:srgbClr val="ffffff"/>
-                  </a:solidFill>
-                </a:uFill>
-                <a:latin typeface="Arial"/>
-              </a:rPr>
-              <a:t>^, </a:t>
-            </a:r>
-            <a:r>
-              <a:rPr b="0" lang="en-GB" sz="1800" spc="-1" strike="noStrike">
-                <a:solidFill>
-                  <a:srgbClr val="000000"/>
-                </a:solidFill>
-                <a:uFill>
-                  <a:solidFill>
-                    <a:srgbClr val="ffffff"/>
-                  </a:solidFill>
-                </a:uFill>
-                <a:latin typeface="Arial"/>
-              </a:rPr>
-              <a:t>Ω</a:t>
-            </a:r>
-            <a:r>
-              <a:rPr b="0" lang="en-GB" sz="1800" spc="-1" strike="noStrike">
-                <a:solidFill>
-                  <a:srgbClr val="000000"/>
-                </a:solidFill>
-                <a:uFill>
-                  <a:solidFill>
-                    <a:srgbClr val="ffffff"/>
-                  </a:solidFill>
-                </a:uFill>
-                <a:latin typeface="Arial"/>
-              </a:rPr>
-              <a:t>)</a:t>
+              <a:t>the </a:t>
+            </a:r>
+            <a:r>
+              <a:rPr b="0" lang="en-GB" sz="1800" spc="-1" strike="noStrike">
+                <a:solidFill>
+                  <a:srgbClr val="000000"/>
+                </a:solidFill>
+                <a:uFill>
+                  <a:solidFill>
+                    <a:srgbClr val="ffffff"/>
+                  </a:solidFill>
+                </a:uFill>
+                <a:latin typeface="Arial"/>
+              </a:rPr>
+              <a:t>qua</a:t>
+            </a:r>
+            <a:r>
+              <a:rPr b="0" lang="en-GB" sz="1800" spc="-1" strike="noStrike">
+                <a:solidFill>
+                  <a:srgbClr val="000000"/>
+                </a:solidFill>
+                <a:uFill>
+                  <a:solidFill>
+                    <a:srgbClr val="ffffff"/>
+                  </a:solidFill>
+                </a:uFill>
+                <a:latin typeface="Arial"/>
+              </a:rPr>
+              <a:t>rtet </a:t>
+            </a:r>
+            <a:r>
+              <a:rPr b="0" lang="en-GB" sz="1800" spc="-1" strike="noStrike">
+                <a:solidFill>
+                  <a:srgbClr val="000000"/>
+                </a:solidFill>
+                <a:uFill>
+                  <a:solidFill>
+                    <a:srgbClr val="ffffff"/>
+                  </a:solidFill>
+                </a:uFill>
+                <a:latin typeface="Arial"/>
+              </a:rPr>
+              <a:t>(+, </a:t>
+            </a:r>
+            <a:r>
+              <a:rPr b="0" lang="en-GB" sz="1800" spc="-1" strike="noStrike">
+                <a:solidFill>
+                  <a:srgbClr val="000000"/>
+                </a:solidFill>
+                <a:uFill>
+                  <a:solidFill>
+                    <a:srgbClr val="ffffff"/>
+                  </a:solidFill>
+                </a:uFill>
+                <a:latin typeface="Arial"/>
+              </a:rPr>
+              <a:t>*, ^, </a:t>
+            </a:r>
+            <a:r>
+              <a:rPr b="0" lang="en-GB" sz="1800" spc="-1" strike="noStrike">
+                <a:solidFill>
+                  <a:srgbClr val="000000"/>
+                </a:solidFill>
+                <a:uFill>
+                  <a:solidFill>
+                    <a:srgbClr val="ffffff"/>
+                  </a:solidFill>
+                </a:uFill>
+                <a:latin typeface="Arial"/>
+              </a:rPr>
+              <a:t>Ω)</a:t>
             </a:r>
             <a:endParaRPr b="0" lang="en-GB" sz="1800" spc="-1" strike="noStrike">
               <a:solidFill>
@@ -19788,14 +19410,257 @@
             </a:endParaRPr>
           </a:p>
           <a:p>
-            <a:pPr marL="216000" indent="-216000">
-              <a:buClr>
-                <a:srgbClr val="000000"/>
-              </a:buClr>
-              <a:buSzPct val="45000"/>
-              <a:buFont typeface="Wingdings" charset="2"/>
-              <a:buChar char=""/>
-            </a:pPr>
+            <a:endParaRPr b="0" lang="en-GB" sz="1800" spc="-1" strike="noStrike">
+              <a:solidFill>
+                <a:srgbClr val="000000"/>
+              </a:solidFill>
+              <a:uFill>
+                <a:solidFill>
+                  <a:srgbClr val="ffffff"/>
+                </a:solidFill>
+              </a:uFill>
+              <a:latin typeface="Arial"/>
+            </a:endParaRPr>
+          </a:p>
+          <a:p>
+            <a:r>
+              <a:rPr b="0" lang="en-GB" sz="1800" spc="-1" strike="noStrike">
+                <a:solidFill>
+                  <a:srgbClr val="000000"/>
+                </a:solidFill>
+                <a:uFill>
+                  <a:solidFill>
+                    <a:srgbClr val="ffffff"/>
+                  </a:solidFill>
+                </a:uFill>
+                <a:latin typeface="Arial"/>
+              </a:rPr>
+              <a:t>Giv</a:t>
+            </a:r>
+            <a:r>
+              <a:rPr b="0" lang="en-GB" sz="1800" spc="-1" strike="noStrike">
+                <a:solidFill>
+                  <a:srgbClr val="000000"/>
+                </a:solidFill>
+                <a:uFill>
+                  <a:solidFill>
+                    <a:srgbClr val="ffffff"/>
+                  </a:solidFill>
+                </a:uFill>
+                <a:latin typeface="Arial"/>
+              </a:rPr>
+              <a:t>en </a:t>
+            </a:r>
+            <a:r>
+              <a:rPr b="0" lang="en-GB" sz="1800" spc="-1" strike="noStrike">
+                <a:solidFill>
+                  <a:srgbClr val="000000"/>
+                </a:solidFill>
+                <a:uFill>
+                  <a:solidFill>
+                    <a:srgbClr val="ffffff"/>
+                  </a:solidFill>
+                </a:uFill>
+                <a:latin typeface="Arial"/>
+              </a:rPr>
+              <a:t>mu</a:t>
+            </a:r>
+            <a:r>
+              <a:rPr b="0" lang="en-GB" sz="1800" spc="-1" strike="noStrike">
+                <a:solidFill>
+                  <a:srgbClr val="000000"/>
+                </a:solidFill>
+                <a:uFill>
+                  <a:solidFill>
+                    <a:srgbClr val="ffffff"/>
+                  </a:solidFill>
+                </a:uFill>
+                <a:latin typeface="Arial"/>
+              </a:rPr>
+              <a:t>sica</a:t>
+            </a:r>
+            <a:r>
+              <a:rPr b="0" lang="en-GB" sz="1800" spc="-1" strike="noStrike">
+                <a:solidFill>
+                  <a:srgbClr val="000000"/>
+                </a:solidFill>
+                <a:uFill>
+                  <a:solidFill>
+                    <a:srgbClr val="ffffff"/>
+                  </a:solidFill>
+                </a:uFill>
+                <a:latin typeface="Arial"/>
+              </a:rPr>
+              <a:t>l </a:t>
+            </a:r>
+            <a:r>
+              <a:rPr b="0" lang="en-GB" sz="1800" spc="-1" strike="noStrike">
+                <a:solidFill>
+                  <a:srgbClr val="000000"/>
+                </a:solidFill>
+                <a:uFill>
+                  <a:solidFill>
+                    <a:srgbClr val="ffffff"/>
+                  </a:solidFill>
+                </a:uFill>
+                <a:latin typeface="Arial"/>
+              </a:rPr>
+              <a:t>obj</a:t>
+            </a:r>
+            <a:r>
+              <a:rPr b="0" lang="en-GB" sz="1800" spc="-1" strike="noStrike">
+                <a:solidFill>
+                  <a:srgbClr val="000000"/>
+                </a:solidFill>
+                <a:uFill>
+                  <a:solidFill>
+                    <a:srgbClr val="ffffff"/>
+                  </a:solidFill>
+                </a:uFill>
+                <a:latin typeface="Arial"/>
+              </a:rPr>
+              <a:t>ect</a:t>
+            </a:r>
+            <a:r>
+              <a:rPr b="0" lang="en-GB" sz="1800" spc="-1" strike="noStrike">
+                <a:solidFill>
+                  <a:srgbClr val="000000"/>
+                </a:solidFill>
+                <a:uFill>
+                  <a:solidFill>
+                    <a:srgbClr val="ffffff"/>
+                  </a:solidFill>
+                </a:uFill>
+                <a:latin typeface="Arial"/>
+              </a:rPr>
+              <a:t>s A </a:t>
+            </a:r>
+            <a:r>
+              <a:rPr b="0" lang="en-GB" sz="1800" spc="-1" strike="noStrike">
+                <a:solidFill>
+                  <a:srgbClr val="000000"/>
+                </a:solidFill>
+                <a:uFill>
+                  <a:solidFill>
+                    <a:srgbClr val="ffffff"/>
+                  </a:solidFill>
+                </a:uFill>
+                <a:latin typeface="Arial"/>
+              </a:rPr>
+              <a:t>and </a:t>
+            </a:r>
+            <a:r>
+              <a:rPr b="0" lang="en-GB" sz="1800" spc="-1" strike="noStrike">
+                <a:solidFill>
+                  <a:srgbClr val="000000"/>
+                </a:solidFill>
+                <a:uFill>
+                  <a:solidFill>
+                    <a:srgbClr val="ffffff"/>
+                  </a:solidFill>
+                </a:uFill>
+                <a:latin typeface="Arial"/>
+              </a:rPr>
+              <a:t>B, </a:t>
+            </a:r>
+            <a:r>
+              <a:rPr b="0" lang="en-GB" sz="1800" spc="-1" strike="noStrike">
+                <a:solidFill>
+                  <a:srgbClr val="000000"/>
+                </a:solidFill>
+                <a:uFill>
+                  <a:solidFill>
+                    <a:srgbClr val="ffffff"/>
+                  </a:solidFill>
+                </a:uFill>
+                <a:latin typeface="Arial"/>
+              </a:rPr>
+              <a:t>ther</a:t>
+            </a:r>
+            <a:r>
+              <a:rPr b="0" lang="en-GB" sz="1800" spc="-1" strike="noStrike">
+                <a:solidFill>
+                  <a:srgbClr val="000000"/>
+                </a:solidFill>
+                <a:uFill>
+                  <a:solidFill>
+                    <a:srgbClr val="ffffff"/>
+                  </a:solidFill>
+                </a:uFill>
+                <a:latin typeface="Arial"/>
+              </a:rPr>
+              <a:t>e is </a:t>
+            </a:r>
+            <a:r>
+              <a:rPr b="0" lang="en-GB" sz="1800" spc="-1" strike="noStrike">
+                <a:solidFill>
+                  <a:srgbClr val="000000"/>
+                </a:solidFill>
+                <a:uFill>
+                  <a:solidFill>
+                    <a:srgbClr val="ffffff"/>
+                  </a:solidFill>
+                </a:uFill>
+                <a:latin typeface="Arial"/>
+              </a:rPr>
+              <a:t>ano</a:t>
+            </a:r>
+            <a:r>
+              <a:rPr b="0" lang="en-GB" sz="1800" spc="-1" strike="noStrike">
+                <a:solidFill>
+                  <a:srgbClr val="000000"/>
+                </a:solidFill>
+                <a:uFill>
+                  <a:solidFill>
+                    <a:srgbClr val="ffffff"/>
+                  </a:solidFill>
+                </a:uFill>
+                <a:latin typeface="Arial"/>
+              </a:rPr>
+              <a:t>ther </a:t>
+            </a:r>
+            <a:r>
+              <a:rPr b="0" lang="en-GB" sz="1800" spc="-1" strike="noStrike">
+                <a:solidFill>
+                  <a:srgbClr val="000000"/>
+                </a:solidFill>
+                <a:uFill>
+                  <a:solidFill>
+                    <a:srgbClr val="ffffff"/>
+                  </a:solidFill>
+                </a:uFill>
+                <a:latin typeface="Arial"/>
+              </a:rPr>
+              <a:t>one </a:t>
+            </a:r>
+            <a:r>
+              <a:rPr b="0" lang="en-GB" sz="1800" spc="-1" strike="noStrike">
+                <a:solidFill>
+                  <a:srgbClr val="000000"/>
+                </a:solidFill>
+                <a:uFill>
+                  <a:solidFill>
+                    <a:srgbClr val="ffffff"/>
+                  </a:solidFill>
+                </a:uFill>
+                <a:latin typeface="Arial"/>
+              </a:rPr>
+              <a:t>B</a:t>
+            </a:r>
+            <a:r>
+              <a:rPr b="0" lang="en-GB" sz="1800" spc="-1" strike="noStrike" baseline="101000">
+                <a:solidFill>
+                  <a:srgbClr val="000000"/>
+                </a:solidFill>
+                <a:uFill>
+                  <a:solidFill>
+                    <a:srgbClr val="ffffff"/>
+                  </a:solidFill>
+                </a:uFill>
+                <a:latin typeface="Arial"/>
+              </a:rPr>
+              <a:t>A</a:t>
+            </a:r>
             <a:r>
               <a:rPr b="0" lang="en-GB" sz="1800" spc="-1" strike="noStrike">
                 <a:solidFill>
@@ -19810,6 +19675,286 @@
               </a:rPr>
               <a:t> </a:t>
             </a:r>
+            <a:r>
+              <a:rPr b="0" lang="en-GB" sz="1800" spc="-1" strike="noStrike">
+                <a:solidFill>
+                  <a:srgbClr val="000000"/>
+                </a:solidFill>
+                <a:uFill>
+                  <a:solidFill>
+                    <a:srgbClr val="ffffff"/>
+                  </a:solidFill>
+                </a:uFill>
+                <a:latin typeface="Arial"/>
+              </a:rPr>
+              <a:t>repr</a:t>
+            </a:r>
+            <a:r>
+              <a:rPr b="0" lang="en-GB" sz="1800" spc="-1" strike="noStrike">
+                <a:solidFill>
+                  <a:srgbClr val="000000"/>
+                </a:solidFill>
+                <a:uFill>
+                  <a:solidFill>
+                    <a:srgbClr val="ffffff"/>
+                  </a:solidFill>
+                </a:uFill>
+                <a:latin typeface="Arial"/>
+              </a:rPr>
+              <a:t>ese</a:t>
+            </a:r>
+            <a:r>
+              <a:rPr b="0" lang="en-GB" sz="1800" spc="-1" strike="noStrike">
+                <a:solidFill>
+                  <a:srgbClr val="000000"/>
+                </a:solidFill>
+                <a:uFill>
+                  <a:solidFill>
+                    <a:srgbClr val="ffffff"/>
+                  </a:solidFill>
+                </a:uFill>
+                <a:latin typeface="Arial"/>
+              </a:rPr>
+              <a:t>ntin</a:t>
+            </a:r>
+            <a:r>
+              <a:rPr b="0" lang="en-GB" sz="1800" spc="-1" strike="noStrike">
+                <a:solidFill>
+                  <a:srgbClr val="000000"/>
+                </a:solidFill>
+                <a:uFill>
+                  <a:solidFill>
+                    <a:srgbClr val="ffffff"/>
+                  </a:solidFill>
+                </a:uFill>
+                <a:latin typeface="Arial"/>
+              </a:rPr>
+              <a:t>g </a:t>
+            </a:r>
+            <a:r>
+              <a:rPr b="0" lang="en-GB" sz="1800" spc="-1" strike="noStrike">
+                <a:solidFill>
+                  <a:srgbClr val="000000"/>
+                </a:solidFill>
+                <a:uFill>
+                  <a:solidFill>
+                    <a:srgbClr val="ffffff"/>
+                  </a:solidFill>
+                </a:uFill>
+                <a:latin typeface="Arial"/>
+              </a:rPr>
+              <a:t>the </a:t>
+            </a:r>
+            <a:r>
+              <a:rPr b="0" lang="en-GB" sz="1800" spc="-1" strike="noStrike">
+                <a:solidFill>
+                  <a:srgbClr val="000000"/>
+                </a:solidFill>
+                <a:uFill>
+                  <a:solidFill>
+                    <a:srgbClr val="ffffff"/>
+                  </a:solidFill>
+                </a:uFill>
+                <a:latin typeface="Arial"/>
+              </a:rPr>
+              <a:t>arro</a:t>
+            </a:r>
+            <a:r>
+              <a:rPr b="0" lang="en-GB" sz="1800" spc="-1" strike="noStrike">
+                <a:solidFill>
+                  <a:srgbClr val="000000"/>
+                </a:solidFill>
+                <a:uFill>
+                  <a:solidFill>
+                    <a:srgbClr val="ffffff"/>
+                  </a:solidFill>
+                </a:uFill>
+                <a:latin typeface="Arial"/>
+              </a:rPr>
+              <a:t>ws </a:t>
+            </a:r>
+            <a:r>
+              <a:rPr b="0" lang="en-GB" sz="1800" spc="-1" strike="noStrike">
+                <a:solidFill>
+                  <a:srgbClr val="000000"/>
+                </a:solidFill>
+                <a:uFill>
+                  <a:solidFill>
+                    <a:srgbClr val="ffffff"/>
+                  </a:solidFill>
+                </a:uFill>
+                <a:latin typeface="Arial"/>
+              </a:rPr>
+              <a:t>fro</a:t>
+            </a:r>
+            <a:r>
+              <a:rPr b="0" lang="en-GB" sz="1800" spc="-1" strike="noStrike">
+                <a:solidFill>
+                  <a:srgbClr val="000000"/>
+                </a:solidFill>
+                <a:uFill>
+                  <a:solidFill>
+                    <a:srgbClr val="ffffff"/>
+                  </a:solidFill>
+                </a:uFill>
+                <a:latin typeface="Arial"/>
+              </a:rPr>
+              <a:t>m A </a:t>
+            </a:r>
+            <a:r>
+              <a:rPr b="0" lang="en-GB" sz="1800" spc="-1" strike="noStrike">
+                <a:solidFill>
+                  <a:srgbClr val="000000"/>
+                </a:solidFill>
+                <a:uFill>
+                  <a:solidFill>
+                    <a:srgbClr val="ffffff"/>
+                  </a:solidFill>
+                </a:uFill>
+                <a:latin typeface="Arial"/>
+              </a:rPr>
+              <a:t>→ </a:t>
+            </a:r>
+            <a:r>
+              <a:rPr b="0" lang="en-GB" sz="1800" spc="-1" strike="noStrike">
+                <a:solidFill>
+                  <a:srgbClr val="000000"/>
+                </a:solidFill>
+                <a:uFill>
+                  <a:solidFill>
+                    <a:srgbClr val="ffffff"/>
+                  </a:solidFill>
+                </a:uFill>
+                <a:latin typeface="Arial"/>
+              </a:rPr>
+              <a:t>B  , </a:t>
+            </a:r>
+            <a:r>
+              <a:rPr b="0" lang="en-GB" sz="1800" spc="-1" strike="noStrike">
+                <a:solidFill>
+                  <a:srgbClr val="000000"/>
+                </a:solidFill>
+                <a:uFill>
+                  <a:solidFill>
+                    <a:srgbClr val="ffffff"/>
+                  </a:solidFill>
+                </a:uFill>
+                <a:latin typeface="Arial"/>
+              </a:rPr>
+              <a:t>i.e. </a:t>
+            </a:r>
+            <a:r>
+              <a:rPr b="0" lang="en-GB" sz="1800" spc="-1" strike="noStrike">
+                <a:solidFill>
+                  <a:srgbClr val="000000"/>
+                </a:solidFill>
+                <a:uFill>
+                  <a:solidFill>
+                    <a:srgbClr val="ffffff"/>
+                  </a:solidFill>
+                </a:uFill>
+                <a:latin typeface="Arial"/>
+              </a:rPr>
+              <a:t>ma</a:t>
+            </a:r>
+            <a:r>
+              <a:rPr b="0" lang="en-GB" sz="1800" spc="-1" strike="noStrike">
+                <a:solidFill>
+                  <a:srgbClr val="000000"/>
+                </a:solidFill>
+                <a:uFill>
+                  <a:solidFill>
+                    <a:srgbClr val="ffffff"/>
+                  </a:solidFill>
+                </a:uFill>
+                <a:latin typeface="Arial"/>
+              </a:rPr>
+              <a:t>ppi</a:t>
+            </a:r>
+            <a:r>
+              <a:rPr b="0" lang="en-GB" sz="1800" spc="-1" strike="noStrike">
+                <a:solidFill>
+                  <a:srgbClr val="000000"/>
+                </a:solidFill>
+                <a:uFill>
+                  <a:solidFill>
+                    <a:srgbClr val="ffffff"/>
+                  </a:solidFill>
+                </a:uFill>
+                <a:latin typeface="Arial"/>
+              </a:rPr>
+              <a:t>ngs </a:t>
+            </a:r>
+            <a:r>
+              <a:rPr b="0" lang="en-GB" sz="1800" spc="-1" strike="noStrike">
+                <a:solidFill>
+                  <a:srgbClr val="000000"/>
+                </a:solidFill>
+                <a:uFill>
+                  <a:solidFill>
+                    <a:srgbClr val="ffffff"/>
+                  </a:solidFill>
+                </a:uFill>
+                <a:latin typeface="Arial"/>
+              </a:rPr>
+              <a:t>that </a:t>
+            </a:r>
+            <a:r>
+              <a:rPr b="0" lang="en-GB" sz="1800" spc="-1" strike="noStrike">
+                <a:solidFill>
+                  <a:srgbClr val="000000"/>
+                </a:solidFill>
+                <a:uFill>
+                  <a:solidFill>
+                    <a:srgbClr val="ffffff"/>
+                  </a:solidFill>
+                </a:uFill>
+                <a:latin typeface="Arial"/>
+              </a:rPr>
+              <a:t>pre</a:t>
+            </a:r>
+            <a:r>
+              <a:rPr b="0" lang="en-GB" sz="1800" spc="-1" strike="noStrike">
+                <a:solidFill>
+                  <a:srgbClr val="000000"/>
+                </a:solidFill>
+                <a:uFill>
+                  <a:solidFill>
+                    <a:srgbClr val="ffffff"/>
+                  </a:solidFill>
+                </a:uFill>
+                <a:latin typeface="Arial"/>
+              </a:rPr>
+              <a:t>ser</a:t>
+            </a:r>
+            <a:r>
+              <a:rPr b="0" lang="en-GB" sz="1800" spc="-1" strike="noStrike">
+                <a:solidFill>
+                  <a:srgbClr val="000000"/>
+                </a:solidFill>
+                <a:uFill>
+                  <a:solidFill>
+                    <a:srgbClr val="ffffff"/>
+                  </a:solidFill>
+                </a:uFill>
+                <a:latin typeface="Arial"/>
+              </a:rPr>
+              <a:t>ve </a:t>
+            </a:r>
+            <a:r>
+              <a:rPr b="0" lang="en-GB" sz="1800" spc="-1" strike="noStrike">
+                <a:solidFill>
+                  <a:srgbClr val="000000"/>
+                </a:solidFill>
+                <a:uFill>
+                  <a:solidFill>
+                    <a:srgbClr val="ffffff"/>
+                  </a:solidFill>
+                </a:uFill>
+                <a:latin typeface="Arial"/>
+              </a:rPr>
+              <a:t>T</a:t>
+            </a:r>
             <a:endParaRPr b="0" lang="en-GB" sz="1800" spc="-1" strike="noStrike">
               <a:solidFill>
                 <a:srgbClr val="000000"/>
@@ -19823,265 +19968,74 @@
             </a:endParaRPr>
           </a:p>
           <a:p>
-            <a:pPr marL="216000" indent="-216000">
-              <a:buClr>
-                <a:srgbClr val="000000"/>
-              </a:buClr>
-              <a:buSzPct val="45000"/>
-              <a:buFont typeface="Wingdings" charset="2"/>
-              <a:buChar char=""/>
-            </a:pPr>
-            <a:r>
-              <a:rPr b="0" lang="en-GB" sz="1800" spc="-1" strike="noStrike">
-                <a:solidFill>
-                  <a:srgbClr val="000000"/>
-                </a:solidFill>
-                <a:uFill>
-                  <a:solidFill>
-                    <a:srgbClr val="ffffff"/>
-                  </a:solidFill>
-                </a:uFill>
-                <a:latin typeface="Arial"/>
-              </a:rPr>
-              <a:t>G</a:t>
-            </a:r>
-            <a:r>
-              <a:rPr b="0" lang="en-GB" sz="1800" spc="-1" strike="noStrike">
-                <a:solidFill>
-                  <a:srgbClr val="000000"/>
-                </a:solidFill>
-                <a:uFill>
-                  <a:solidFill>
-                    <a:srgbClr val="ffffff"/>
-                  </a:solidFill>
-                </a:uFill>
-                <a:latin typeface="Arial"/>
-              </a:rPr>
-              <a:t>iv</a:t>
-            </a:r>
-            <a:r>
-              <a:rPr b="0" lang="en-GB" sz="1800" spc="-1" strike="noStrike">
-                <a:solidFill>
-                  <a:srgbClr val="000000"/>
-                </a:solidFill>
-                <a:uFill>
-                  <a:solidFill>
-                    <a:srgbClr val="ffffff"/>
-                  </a:solidFill>
-                </a:uFill>
-                <a:latin typeface="Arial"/>
-              </a:rPr>
-              <a:t>e</a:t>
-            </a:r>
-            <a:r>
-              <a:rPr b="0" lang="en-GB" sz="1800" spc="-1" strike="noStrike">
-                <a:solidFill>
-                  <a:srgbClr val="000000"/>
-                </a:solidFill>
-                <a:uFill>
-                  <a:solidFill>
-                    <a:srgbClr val="ffffff"/>
-                  </a:solidFill>
-                </a:uFill>
-                <a:latin typeface="Arial"/>
-              </a:rPr>
-              <a:t>n </a:t>
-            </a:r>
-            <a:r>
-              <a:rPr b="0" lang="en-GB" sz="1800" spc="-1" strike="noStrike">
-                <a:solidFill>
-                  <a:srgbClr val="000000"/>
-                </a:solidFill>
-                <a:uFill>
-                  <a:solidFill>
-                    <a:srgbClr val="ffffff"/>
-                  </a:solidFill>
-                </a:uFill>
-                <a:latin typeface="Arial"/>
-              </a:rPr>
-              <a:t>m</a:t>
-            </a:r>
-            <a:r>
-              <a:rPr b="0" lang="en-GB" sz="1800" spc="-1" strike="noStrike">
-                <a:solidFill>
-                  <a:srgbClr val="000000"/>
-                </a:solidFill>
-                <a:uFill>
-                  <a:solidFill>
-                    <a:srgbClr val="ffffff"/>
-                  </a:solidFill>
-                </a:uFill>
-                <a:latin typeface="Arial"/>
-              </a:rPr>
-              <a:t>u</a:t>
-            </a:r>
-            <a:r>
-              <a:rPr b="0" lang="en-GB" sz="1800" spc="-1" strike="noStrike">
-                <a:solidFill>
-                  <a:srgbClr val="000000"/>
-                </a:solidFill>
-                <a:uFill>
-                  <a:solidFill>
-                    <a:srgbClr val="ffffff"/>
-                  </a:solidFill>
-                </a:uFill>
-                <a:latin typeface="Arial"/>
-              </a:rPr>
-              <a:t>si</a:t>
-            </a:r>
-            <a:r>
-              <a:rPr b="0" lang="en-GB" sz="1800" spc="-1" strike="noStrike">
-                <a:solidFill>
-                  <a:srgbClr val="000000"/>
-                </a:solidFill>
-                <a:uFill>
-                  <a:solidFill>
-                    <a:srgbClr val="ffffff"/>
-                  </a:solidFill>
-                </a:uFill>
-                <a:latin typeface="Arial"/>
-              </a:rPr>
-              <a:t>c</a:t>
-            </a:r>
-            <a:r>
-              <a:rPr b="0" lang="en-GB" sz="1800" spc="-1" strike="noStrike">
-                <a:solidFill>
-                  <a:srgbClr val="000000"/>
-                </a:solidFill>
-                <a:uFill>
-                  <a:solidFill>
-                    <a:srgbClr val="ffffff"/>
-                  </a:solidFill>
-                </a:uFill>
-                <a:latin typeface="Arial"/>
-              </a:rPr>
-              <a:t>al </a:t>
-            </a:r>
-            <a:r>
-              <a:rPr b="0" lang="en-GB" sz="1800" spc="-1" strike="noStrike">
-                <a:solidFill>
-                  <a:srgbClr val="000000"/>
-                </a:solidFill>
-                <a:uFill>
-                  <a:solidFill>
-                    <a:srgbClr val="ffffff"/>
-                  </a:solidFill>
-                </a:uFill>
-                <a:latin typeface="Arial"/>
-              </a:rPr>
-              <a:t>o</a:t>
-            </a:r>
-            <a:r>
-              <a:rPr b="0" lang="en-GB" sz="1800" spc="-1" strike="noStrike">
-                <a:solidFill>
-                  <a:srgbClr val="000000"/>
-                </a:solidFill>
-                <a:uFill>
-                  <a:solidFill>
-                    <a:srgbClr val="ffffff"/>
-                  </a:solidFill>
-                </a:uFill>
-                <a:latin typeface="Arial"/>
-              </a:rPr>
-              <a:t>bj</a:t>
-            </a:r>
-            <a:r>
-              <a:rPr b="0" lang="en-GB" sz="1800" spc="-1" strike="noStrike">
-                <a:solidFill>
-                  <a:srgbClr val="000000"/>
-                </a:solidFill>
-                <a:uFill>
-                  <a:solidFill>
-                    <a:srgbClr val="ffffff"/>
-                  </a:solidFill>
-                </a:uFill>
-                <a:latin typeface="Arial"/>
-              </a:rPr>
-              <a:t>e</a:t>
-            </a:r>
-            <a:r>
-              <a:rPr b="0" lang="en-GB" sz="1800" spc="-1" strike="noStrike">
-                <a:solidFill>
-                  <a:srgbClr val="000000"/>
-                </a:solidFill>
-                <a:uFill>
-                  <a:solidFill>
-                    <a:srgbClr val="ffffff"/>
-                  </a:solidFill>
-                </a:uFill>
-                <a:latin typeface="Arial"/>
-              </a:rPr>
-              <a:t>ct</a:t>
-            </a:r>
-            <a:r>
-              <a:rPr b="0" lang="en-GB" sz="1800" spc="-1" strike="noStrike">
-                <a:solidFill>
-                  <a:srgbClr val="000000"/>
-                </a:solidFill>
-                <a:uFill>
-                  <a:solidFill>
-                    <a:srgbClr val="ffffff"/>
-                  </a:solidFill>
-                </a:uFill>
-                <a:latin typeface="Arial"/>
-              </a:rPr>
-              <a:t>s </a:t>
-            </a:r>
-            <a:r>
-              <a:rPr b="0" lang="en-GB" sz="1800" spc="-1" strike="noStrike">
-                <a:solidFill>
-                  <a:srgbClr val="000000"/>
-                </a:solidFill>
-                <a:uFill>
-                  <a:solidFill>
-                    <a:srgbClr val="ffffff"/>
-                  </a:solidFill>
-                </a:uFill>
-                <a:latin typeface="Arial"/>
-              </a:rPr>
-              <a:t>A </a:t>
-            </a:r>
-            <a:r>
-              <a:rPr b="0" lang="en-GB" sz="1800" spc="-1" strike="noStrike">
-                <a:solidFill>
-                  <a:srgbClr val="000000"/>
-                </a:solidFill>
-                <a:uFill>
-                  <a:solidFill>
-                    <a:srgbClr val="ffffff"/>
-                  </a:solidFill>
-                </a:uFill>
-                <a:latin typeface="Arial"/>
-              </a:rPr>
-              <a:t>a</a:t>
-            </a:r>
-            <a:r>
-              <a:rPr b="0" lang="en-GB" sz="1800" spc="-1" strike="noStrike">
-                <a:solidFill>
-                  <a:srgbClr val="000000"/>
-                </a:solidFill>
-                <a:uFill>
-                  <a:solidFill>
-                    <a:srgbClr val="ffffff"/>
-                  </a:solidFill>
-                </a:uFill>
-                <a:latin typeface="Arial"/>
-              </a:rPr>
-              <a:t>n</a:t>
-            </a:r>
-            <a:r>
-              <a:rPr b="0" lang="en-GB" sz="1800" spc="-1" strike="noStrike">
-                <a:solidFill>
-                  <a:srgbClr val="000000"/>
-                </a:solidFill>
-                <a:uFill>
-                  <a:solidFill>
-                    <a:srgbClr val="ffffff"/>
-                  </a:solidFill>
-                </a:uFill>
-                <a:latin typeface="Arial"/>
-              </a:rPr>
-              <a:t>d </a:t>
+            <a:endParaRPr b="0" lang="en-GB" sz="1800" spc="-1" strike="noStrike">
+              <a:solidFill>
+                <a:srgbClr val="000000"/>
+              </a:solidFill>
+              <a:uFill>
+                <a:solidFill>
+                  <a:srgbClr val="ffffff"/>
+                </a:solidFill>
+              </a:uFill>
+              <a:latin typeface="Arial"/>
+            </a:endParaRPr>
+          </a:p>
+          <a:p>
+            <a:r>
+              <a:rPr b="0" lang="en-GB" sz="1800" spc="-1" strike="noStrike">
+                <a:solidFill>
+                  <a:srgbClr val="000000"/>
+                </a:solidFill>
+                <a:uFill>
+                  <a:solidFill>
+                    <a:srgbClr val="ffffff"/>
+                  </a:solidFill>
+                </a:uFill>
+                <a:latin typeface="Arial"/>
+              </a:rPr>
+              <a:t>Cal</a:t>
+            </a:r>
+            <a:r>
+              <a:rPr b="0" lang="en-GB" sz="1800" spc="-1" strike="noStrike">
+                <a:solidFill>
+                  <a:srgbClr val="000000"/>
+                </a:solidFill>
+                <a:uFill>
+                  <a:solidFill>
+                    <a:srgbClr val="ffffff"/>
+                  </a:solidFill>
+                </a:uFill>
+                <a:latin typeface="Arial"/>
+              </a:rPr>
+              <a:t>cul</a:t>
+            </a:r>
+            <a:r>
+              <a:rPr b="0" lang="en-GB" sz="1800" spc="-1" strike="noStrike">
+                <a:solidFill>
+                  <a:srgbClr val="000000"/>
+                </a:solidFill>
+                <a:uFill>
+                  <a:solidFill>
+                    <a:srgbClr val="ffffff"/>
+                  </a:solidFill>
+                </a:uFill>
+                <a:latin typeface="Arial"/>
+              </a:rPr>
+              <a:t>atin</a:t>
+            </a:r>
+            <a:r>
+              <a:rPr b="0" lang="en-GB" sz="1800" spc="-1" strike="noStrike">
+                <a:solidFill>
+                  <a:srgbClr val="000000"/>
+                </a:solidFill>
+                <a:uFill>
+                  <a:solidFill>
+                    <a:srgbClr val="ffffff"/>
+                  </a:solidFill>
+                </a:uFill>
+                <a:latin typeface="Arial"/>
+              </a:rPr>
+              <a:t>g </a:t>
             </a:r>
             <a:r>
               <a:rPr b="0" lang="en-GB" sz="1800" spc="-1" strike="noStrike">
@@ -20098,88 +20052,32 @@
               <a:t>B</a:t>
             </a:r>
             <a:r>
-              <a:rPr b="0" lang="en-GB" sz="1800" spc="-1" strike="noStrike">
-                <a:solidFill>
-                  <a:srgbClr val="000000"/>
-                </a:solidFill>
-                <a:uFill>
-                  <a:solidFill>
-                    <a:srgbClr val="ffffff"/>
-                  </a:solidFill>
-                </a:uFill>
-                <a:latin typeface="Arial"/>
-              </a:rPr>
-              <a:t>, </a:t>
-            </a:r>
-            <a:r>
-              <a:rPr b="0" lang="en-GB" sz="1800" spc="-1" strike="noStrike">
-                <a:solidFill>
-                  <a:srgbClr val="000000"/>
-                </a:solidFill>
-                <a:uFill>
-                  <a:solidFill>
-                    <a:srgbClr val="ffffff"/>
-                  </a:solidFill>
-                </a:uFill>
-                <a:latin typeface="Arial"/>
-              </a:rPr>
-              <a:t>t</a:t>
-            </a:r>
-            <a:r>
-              <a:rPr b="0" lang="en-GB" sz="1800" spc="-1" strike="noStrike">
-                <a:solidFill>
-                  <a:srgbClr val="000000"/>
-                </a:solidFill>
-                <a:uFill>
-                  <a:solidFill>
-                    <a:srgbClr val="ffffff"/>
-                  </a:solidFill>
-                </a:uFill>
-                <a:latin typeface="Arial"/>
-              </a:rPr>
-              <a:t>h</a:t>
-            </a:r>
-            <a:r>
-              <a:rPr b="0" lang="en-GB" sz="1800" spc="-1" strike="noStrike">
-                <a:solidFill>
-                  <a:srgbClr val="000000"/>
-                </a:solidFill>
-                <a:uFill>
-                  <a:solidFill>
-                    <a:srgbClr val="ffffff"/>
-                  </a:solidFill>
-                </a:uFill>
-                <a:latin typeface="Arial"/>
-              </a:rPr>
-              <a:t>e</a:t>
-            </a:r>
-            <a:r>
-              <a:rPr b="0" lang="en-GB" sz="1800" spc="-1" strike="noStrike">
-                <a:solidFill>
-                  <a:srgbClr val="000000"/>
-                </a:solidFill>
-                <a:uFill>
-                  <a:solidFill>
-                    <a:srgbClr val="ffffff"/>
-                  </a:solidFill>
-                </a:uFill>
-                <a:latin typeface="Arial"/>
-              </a:rPr>
-              <a:t>r</a:t>
-            </a:r>
-            <a:r>
-              <a:rPr b="0" lang="en-GB" sz="1800" spc="-1" strike="noStrike">
-                <a:solidFill>
-                  <a:srgbClr val="000000"/>
-                </a:solidFill>
-                <a:uFill>
-                  <a:solidFill>
-                    <a:srgbClr val="ffffff"/>
-                  </a:solidFill>
-                </a:uFill>
-                <a:latin typeface="Arial"/>
-              </a:rPr>
-              <a:t>e </a:t>
+              <a:rPr b="0" lang="en-GB" sz="1800" spc="-1" strike="noStrike" baseline="101000">
+                <a:solidFill>
+                  <a:srgbClr val="000000"/>
+                </a:solidFill>
+                <a:uFill>
+                  <a:solidFill>
+                    <a:srgbClr val="ffffff"/>
+                  </a:solidFill>
+                </a:uFill>
+                <a:latin typeface="Arial"/>
+              </a:rPr>
+              <a:t>A</a:t>
+            </a:r>
+            <a:r>
+              <a:rPr b="0" lang="en-GB" sz="1800" spc="-1" strike="noStrike">
+                <a:solidFill>
+                  <a:srgbClr val="000000"/>
+                </a:solidFill>
+                <a:uFill>
+                  <a:solidFill>
+                    <a:srgbClr val="ffffff"/>
+                  </a:solidFill>
+                </a:uFill>
+                <a:latin typeface="Arial"/>
+              </a:rPr>
+              <a:t> </a:t>
             </a:r>
             <a:r>
               <a:rPr b="0" lang="en-GB" sz="1800" spc="-1" strike="noStrike">
@@ -20207,1323 +20105,91 @@
                 </a:uFill>
                 <a:latin typeface="Arial"/>
               </a:rPr>
-              <a:t>a</a:t>
-            </a:r>
-            <a:r>
-              <a:rPr b="0" lang="en-GB" sz="1800" spc="-1" strike="noStrike">
-                <a:solidFill>
-                  <a:srgbClr val="000000"/>
-                </a:solidFill>
-                <a:uFill>
-                  <a:solidFill>
-                    <a:srgbClr val="ffffff"/>
-                  </a:solidFill>
-                </a:uFill>
-                <a:latin typeface="Arial"/>
-              </a:rPr>
-              <a:t>n</a:t>
-            </a:r>
-            <a:r>
-              <a:rPr b="0" lang="en-GB" sz="1800" spc="-1" strike="noStrike">
-                <a:solidFill>
-                  <a:srgbClr val="000000"/>
-                </a:solidFill>
-                <a:uFill>
-                  <a:solidFill>
-                    <a:srgbClr val="ffffff"/>
-                  </a:solidFill>
-                </a:uFill>
-                <a:latin typeface="Arial"/>
-              </a:rPr>
-              <a:t>o</a:t>
-            </a:r>
-            <a:r>
-              <a:rPr b="0" lang="en-GB" sz="1800" spc="-1" strike="noStrike">
-                <a:solidFill>
-                  <a:srgbClr val="000000"/>
-                </a:solidFill>
-                <a:uFill>
-                  <a:solidFill>
-                    <a:srgbClr val="ffffff"/>
-                  </a:solidFill>
-                </a:uFill>
-                <a:latin typeface="Arial"/>
-              </a:rPr>
-              <a:t>t</a:t>
-            </a:r>
-            <a:r>
-              <a:rPr b="0" lang="en-GB" sz="1800" spc="-1" strike="noStrike">
-                <a:solidFill>
-                  <a:srgbClr val="000000"/>
-                </a:solidFill>
-                <a:uFill>
-                  <a:solidFill>
-                    <a:srgbClr val="ffffff"/>
-                  </a:solidFill>
-                </a:uFill>
-                <a:latin typeface="Arial"/>
-              </a:rPr>
-              <a:t>h</a:t>
-            </a:r>
-            <a:r>
-              <a:rPr b="0" lang="en-GB" sz="1800" spc="-1" strike="noStrike">
-                <a:solidFill>
-                  <a:srgbClr val="000000"/>
-                </a:solidFill>
-                <a:uFill>
-                  <a:solidFill>
-                    <a:srgbClr val="ffffff"/>
-                  </a:solidFill>
-                </a:uFill>
-                <a:latin typeface="Arial"/>
-              </a:rPr>
-              <a:t>e</a:t>
-            </a:r>
-            <a:r>
-              <a:rPr b="0" lang="en-GB" sz="1800" spc="-1" strike="noStrike">
-                <a:solidFill>
-                  <a:srgbClr val="000000"/>
-                </a:solidFill>
-                <a:uFill>
-                  <a:solidFill>
-                    <a:srgbClr val="ffffff"/>
-                  </a:solidFill>
-                </a:uFill>
-                <a:latin typeface="Arial"/>
-              </a:rPr>
-              <a:t>r </a:t>
-            </a:r>
-            <a:r>
-              <a:rPr b="0" lang="en-GB" sz="1800" spc="-1" strike="noStrike">
-                <a:solidFill>
-                  <a:srgbClr val="000000"/>
-                </a:solidFill>
-                <a:uFill>
-                  <a:solidFill>
-                    <a:srgbClr val="ffffff"/>
-                  </a:solidFill>
-                </a:uFill>
-                <a:latin typeface="Arial"/>
-              </a:rPr>
-              <a:t>o</a:t>
-            </a:r>
-            <a:r>
-              <a:rPr b="0" lang="en-GB" sz="1800" spc="-1" strike="noStrike">
-                <a:solidFill>
-                  <a:srgbClr val="000000"/>
-                </a:solidFill>
-                <a:uFill>
-                  <a:solidFill>
-                    <a:srgbClr val="ffffff"/>
-                  </a:solidFill>
-                </a:uFill>
-                <a:latin typeface="Arial"/>
-              </a:rPr>
-              <a:t>n</a:t>
-            </a:r>
-            <a:r>
-              <a:rPr b="0" lang="en-GB" sz="1800" spc="-1" strike="noStrike">
-                <a:solidFill>
-                  <a:srgbClr val="000000"/>
-                </a:solidFill>
-                <a:uFill>
-                  <a:solidFill>
-                    <a:srgbClr val="ffffff"/>
-                  </a:solidFill>
-                </a:uFill>
-                <a:latin typeface="Arial"/>
-              </a:rPr>
-              <a:t>e </a:t>
-            </a:r>
-            <a:r>
-              <a:rPr b="0" lang="en-GB" sz="1800" spc="-1" strike="noStrike">
-                <a:solidFill>
-                  <a:srgbClr val="000000"/>
-                </a:solidFill>
-                <a:uFill>
-                  <a:solidFill>
-                    <a:srgbClr val="ffffff"/>
-                  </a:solidFill>
-                </a:uFill>
-                <a:latin typeface="Arial"/>
-              </a:rPr>
-              <a:t>B</a:t>
-            </a:r>
-            <a:r>
-              <a:rPr b="0" lang="en-GB" sz="1800" spc="-1" strike="noStrike" baseline="101000">
-                <a:solidFill>
-                  <a:srgbClr val="000000"/>
-                </a:solidFill>
-                <a:uFill>
-                  <a:solidFill>
-                    <a:srgbClr val="ffffff"/>
-                  </a:solidFill>
-                </a:uFill>
-                <a:latin typeface="Arial"/>
-              </a:rPr>
-              <a:t>A</a:t>
-            </a:r>
-            <a:r>
-              <a:rPr b="0" lang="en-GB" sz="1800" spc="-1" strike="noStrike">
-                <a:solidFill>
-                  <a:srgbClr val="000000"/>
-                </a:solidFill>
-                <a:uFill>
-                  <a:solidFill>
-                    <a:srgbClr val="ffffff"/>
-                  </a:solidFill>
-                </a:uFill>
-                <a:latin typeface="Arial"/>
-              </a:rPr>
-              <a:t> </a:t>
-            </a:r>
-            <a:r>
-              <a:rPr b="0" lang="en-GB" sz="1800" spc="-1" strike="noStrike">
-                <a:solidFill>
-                  <a:srgbClr val="000000"/>
-                </a:solidFill>
-                <a:uFill>
-                  <a:solidFill>
-                    <a:srgbClr val="ffffff"/>
-                  </a:solidFill>
-                </a:uFill>
-                <a:latin typeface="Arial"/>
-              </a:rPr>
-              <a:t>r</a:t>
-            </a:r>
-            <a:r>
-              <a:rPr b="0" lang="en-GB" sz="1800" spc="-1" strike="noStrike">
-                <a:solidFill>
-                  <a:srgbClr val="000000"/>
-                </a:solidFill>
-                <a:uFill>
-                  <a:solidFill>
-                    <a:srgbClr val="ffffff"/>
-                  </a:solidFill>
-                </a:uFill>
-                <a:latin typeface="Arial"/>
-              </a:rPr>
-              <a:t>e</a:t>
-            </a:r>
-            <a:r>
-              <a:rPr b="0" lang="en-GB" sz="1800" spc="-1" strike="noStrike">
-                <a:solidFill>
-                  <a:srgbClr val="000000"/>
-                </a:solidFill>
-                <a:uFill>
-                  <a:solidFill>
-                    <a:srgbClr val="ffffff"/>
-                  </a:solidFill>
-                </a:uFill>
-                <a:latin typeface="Arial"/>
-              </a:rPr>
-              <a:t>p</a:t>
-            </a:r>
-            <a:r>
-              <a:rPr b="0" lang="en-GB" sz="1800" spc="-1" strike="noStrike">
-                <a:solidFill>
-                  <a:srgbClr val="000000"/>
-                </a:solidFill>
-                <a:uFill>
-                  <a:solidFill>
-                    <a:srgbClr val="ffffff"/>
-                  </a:solidFill>
-                </a:uFill>
-                <a:latin typeface="Arial"/>
-              </a:rPr>
-              <a:t>r</a:t>
-            </a:r>
-            <a:r>
-              <a:rPr b="0" lang="en-GB" sz="1800" spc="-1" strike="noStrike">
-                <a:solidFill>
-                  <a:srgbClr val="000000"/>
-                </a:solidFill>
-                <a:uFill>
-                  <a:solidFill>
-                    <a:srgbClr val="ffffff"/>
-                  </a:solidFill>
-                </a:uFill>
-                <a:latin typeface="Arial"/>
-              </a:rPr>
-              <a:t>e</a:t>
-            </a:r>
-            <a:r>
-              <a:rPr b="0" lang="en-GB" sz="1800" spc="-1" strike="noStrike">
-                <a:solidFill>
-                  <a:srgbClr val="000000"/>
-                </a:solidFill>
-                <a:uFill>
-                  <a:solidFill>
-                    <a:srgbClr val="ffffff"/>
-                  </a:solidFill>
-                </a:uFill>
-                <a:latin typeface="Arial"/>
-              </a:rPr>
-              <a:t>s</a:t>
-            </a:r>
-            <a:r>
-              <a:rPr b="0" lang="en-GB" sz="1800" spc="-1" strike="noStrike">
-                <a:solidFill>
-                  <a:srgbClr val="000000"/>
-                </a:solidFill>
-                <a:uFill>
-                  <a:solidFill>
-                    <a:srgbClr val="ffffff"/>
-                  </a:solidFill>
-                </a:uFill>
-                <a:latin typeface="Arial"/>
-              </a:rPr>
-              <a:t>e</a:t>
-            </a:r>
-            <a:r>
-              <a:rPr b="0" lang="en-GB" sz="1800" spc="-1" strike="noStrike">
-                <a:solidFill>
-                  <a:srgbClr val="000000"/>
-                </a:solidFill>
-                <a:uFill>
-                  <a:solidFill>
-                    <a:srgbClr val="ffffff"/>
-                  </a:solidFill>
-                </a:uFill>
-                <a:latin typeface="Arial"/>
-              </a:rPr>
-              <a:t>n</a:t>
-            </a:r>
-            <a:r>
-              <a:rPr b="0" lang="en-GB" sz="1800" spc="-1" strike="noStrike">
-                <a:solidFill>
-                  <a:srgbClr val="000000"/>
-                </a:solidFill>
-                <a:uFill>
-                  <a:solidFill>
-                    <a:srgbClr val="ffffff"/>
-                  </a:solidFill>
-                </a:uFill>
-                <a:latin typeface="Arial"/>
-              </a:rPr>
-              <a:t>ti</a:t>
-            </a:r>
-            <a:r>
-              <a:rPr b="0" lang="en-GB" sz="1800" spc="-1" strike="noStrike">
-                <a:solidFill>
-                  <a:srgbClr val="000000"/>
-                </a:solidFill>
-                <a:uFill>
-                  <a:solidFill>
-                    <a:srgbClr val="ffffff"/>
-                  </a:solidFill>
-                </a:uFill>
-                <a:latin typeface="Arial"/>
-              </a:rPr>
-              <a:t>n</a:t>
-            </a:r>
-            <a:r>
-              <a:rPr b="0" lang="en-GB" sz="1800" spc="-1" strike="noStrike">
-                <a:solidFill>
-                  <a:srgbClr val="000000"/>
-                </a:solidFill>
-                <a:uFill>
-                  <a:solidFill>
-                    <a:srgbClr val="ffffff"/>
-                  </a:solidFill>
-                </a:uFill>
-                <a:latin typeface="Arial"/>
-              </a:rPr>
-              <a:t>g </a:t>
-            </a:r>
-            <a:r>
-              <a:rPr b="0" lang="en-GB" sz="1800" spc="-1" strike="noStrike">
-                <a:solidFill>
-                  <a:srgbClr val="000000"/>
-                </a:solidFill>
-                <a:uFill>
-                  <a:solidFill>
-                    <a:srgbClr val="ffffff"/>
-                  </a:solidFill>
-                </a:uFill>
-                <a:latin typeface="Arial"/>
-              </a:rPr>
-              <a:t>t</a:t>
-            </a:r>
-            <a:r>
-              <a:rPr b="0" lang="en-GB" sz="1800" spc="-1" strike="noStrike">
-                <a:solidFill>
-                  <a:srgbClr val="000000"/>
-                </a:solidFill>
-                <a:uFill>
-                  <a:solidFill>
-                    <a:srgbClr val="ffffff"/>
-                  </a:solidFill>
-                </a:uFill>
-                <a:latin typeface="Arial"/>
-              </a:rPr>
-              <a:t>h</a:t>
-            </a:r>
-            <a:r>
-              <a:rPr b="0" lang="en-GB" sz="1800" spc="-1" strike="noStrike">
-                <a:solidFill>
-                  <a:srgbClr val="000000"/>
-                </a:solidFill>
-                <a:uFill>
-                  <a:solidFill>
-                    <a:srgbClr val="ffffff"/>
-                  </a:solidFill>
-                </a:uFill>
-                <a:latin typeface="Arial"/>
-              </a:rPr>
-              <a:t>e </a:t>
-            </a:r>
-            <a:r>
-              <a:rPr b="0" lang="en-GB" sz="1800" spc="-1" strike="noStrike">
-                <a:solidFill>
-                  <a:srgbClr val="000000"/>
-                </a:solidFill>
-                <a:uFill>
-                  <a:solidFill>
-                    <a:srgbClr val="ffffff"/>
-                  </a:solidFill>
-                </a:uFill>
-                <a:latin typeface="Arial"/>
-              </a:rPr>
-              <a:t>a</a:t>
-            </a:r>
-            <a:r>
-              <a:rPr b="0" lang="en-GB" sz="1800" spc="-1" strike="noStrike">
-                <a:solidFill>
-                  <a:srgbClr val="000000"/>
-                </a:solidFill>
-                <a:uFill>
-                  <a:solidFill>
-                    <a:srgbClr val="ffffff"/>
-                  </a:solidFill>
-                </a:uFill>
-                <a:latin typeface="Arial"/>
-              </a:rPr>
-              <a:t>rr</a:t>
-            </a:r>
-            <a:r>
-              <a:rPr b="0" lang="en-GB" sz="1800" spc="-1" strike="noStrike">
-                <a:solidFill>
-                  <a:srgbClr val="000000"/>
-                </a:solidFill>
-                <a:uFill>
-                  <a:solidFill>
-                    <a:srgbClr val="ffffff"/>
-                  </a:solidFill>
-                </a:uFill>
-                <a:latin typeface="Arial"/>
-              </a:rPr>
-              <a:t>o</a:t>
-            </a:r>
-            <a:r>
-              <a:rPr b="0" lang="en-GB" sz="1800" spc="-1" strike="noStrike">
-                <a:solidFill>
-                  <a:srgbClr val="000000"/>
-                </a:solidFill>
-                <a:uFill>
-                  <a:solidFill>
-                    <a:srgbClr val="ffffff"/>
-                  </a:solidFill>
-                </a:uFill>
-                <a:latin typeface="Arial"/>
-              </a:rPr>
-              <a:t>w</a:t>
-            </a:r>
-            <a:r>
-              <a:rPr b="0" lang="en-GB" sz="1800" spc="-1" strike="noStrike">
-                <a:solidFill>
-                  <a:srgbClr val="000000"/>
-                </a:solidFill>
-                <a:uFill>
-                  <a:solidFill>
-                    <a:srgbClr val="ffffff"/>
-                  </a:solidFill>
-                </a:uFill>
-                <a:latin typeface="Arial"/>
-              </a:rPr>
-              <a:t>s </a:t>
-            </a:r>
-            <a:r>
-              <a:rPr b="0" lang="en-GB" sz="1800" spc="-1" strike="noStrike">
-                <a:solidFill>
-                  <a:srgbClr val="000000"/>
-                </a:solidFill>
-                <a:uFill>
-                  <a:solidFill>
-                    <a:srgbClr val="ffffff"/>
-                  </a:solidFill>
-                </a:uFill>
-                <a:latin typeface="Arial"/>
-              </a:rPr>
-              <a:t>fr</a:t>
-            </a:r>
-            <a:r>
-              <a:rPr b="0" lang="en-GB" sz="1800" spc="-1" strike="noStrike">
-                <a:solidFill>
-                  <a:srgbClr val="000000"/>
-                </a:solidFill>
-                <a:uFill>
-                  <a:solidFill>
-                    <a:srgbClr val="ffffff"/>
-                  </a:solidFill>
-                </a:uFill>
-                <a:latin typeface="Arial"/>
-              </a:rPr>
-              <a:t>o</a:t>
-            </a:r>
-            <a:r>
-              <a:rPr b="0" lang="en-GB" sz="1800" spc="-1" strike="noStrike">
-                <a:solidFill>
-                  <a:srgbClr val="000000"/>
-                </a:solidFill>
-                <a:uFill>
-                  <a:solidFill>
-                    <a:srgbClr val="ffffff"/>
-                  </a:solidFill>
-                </a:uFill>
-                <a:latin typeface="Arial"/>
-              </a:rPr>
-              <a:t>m</a:t>
-            </a:r>
-            <a:r>
-              <a:rPr b="0" lang="en-GB" sz="1800" spc="-1" strike="noStrike">
-                <a:solidFill>
-                  <a:srgbClr val="000000"/>
-                </a:solidFill>
-                <a:uFill>
-                  <a:solidFill>
-                    <a:srgbClr val="ffffff"/>
-                  </a:solidFill>
-                </a:uFill>
-                <a:latin typeface="Arial"/>
-              </a:rPr>
-              <a:t> A </a:t>
-            </a:r>
-            <a:r>
-              <a:rPr b="0" lang="en-GB" sz="1800" spc="-1" strike="noStrike">
-                <a:solidFill>
-                  <a:srgbClr val="000000"/>
-                </a:solidFill>
-                <a:uFill>
-                  <a:solidFill>
-                    <a:srgbClr val="ffffff"/>
-                  </a:solidFill>
-                </a:uFill>
-                <a:latin typeface="Arial"/>
-              </a:rPr>
-              <a:t>→</a:t>
-            </a:r>
-            <a:r>
-              <a:rPr b="0" lang="en-GB" sz="1800" spc="-1" strike="noStrike">
-                <a:solidFill>
-                  <a:srgbClr val="000000"/>
-                </a:solidFill>
-                <a:uFill>
-                  <a:solidFill>
-                    <a:srgbClr val="ffffff"/>
-                  </a:solidFill>
-                </a:uFill>
-                <a:latin typeface="Arial"/>
-              </a:rPr>
-              <a:t> </a:t>
-            </a:r>
-            <a:r>
-              <a:rPr b="0" lang="en-GB" sz="1800" spc="-1" strike="noStrike">
-                <a:solidFill>
-                  <a:srgbClr val="000000"/>
-                </a:solidFill>
-                <a:uFill>
-                  <a:solidFill>
-                    <a:srgbClr val="ffffff"/>
-                  </a:solidFill>
-                </a:uFill>
-                <a:latin typeface="Arial"/>
-              </a:rPr>
-              <a:t>B </a:t>
-            </a:r>
-            <a:r>
-              <a:rPr b="0" lang="en-GB" sz="1800" spc="-1" strike="noStrike">
-                <a:solidFill>
-                  <a:srgbClr val="000000"/>
-                </a:solidFill>
-                <a:uFill>
-                  <a:solidFill>
-                    <a:srgbClr val="ffffff"/>
-                  </a:solidFill>
-                </a:uFill>
-                <a:latin typeface="Arial"/>
-              </a:rPr>
-              <a:t> , </a:t>
-            </a:r>
-            <a:r>
-              <a:rPr b="0" lang="en-GB" sz="1800" spc="-1" strike="noStrike">
-                <a:solidFill>
-                  <a:srgbClr val="000000"/>
-                </a:solidFill>
-                <a:uFill>
-                  <a:solidFill>
-                    <a:srgbClr val="ffffff"/>
-                  </a:solidFill>
-                </a:uFill>
-                <a:latin typeface="Arial"/>
-              </a:rPr>
-              <a:t>i.</a:t>
-            </a:r>
-            <a:r>
-              <a:rPr b="0" lang="en-GB" sz="1800" spc="-1" strike="noStrike">
-                <a:solidFill>
-                  <a:srgbClr val="000000"/>
-                </a:solidFill>
-                <a:uFill>
-                  <a:solidFill>
-                    <a:srgbClr val="ffffff"/>
-                  </a:solidFill>
-                </a:uFill>
-                <a:latin typeface="Arial"/>
-              </a:rPr>
-              <a:t>e</a:t>
-            </a:r>
-            <a:r>
-              <a:rPr b="0" lang="en-GB" sz="1800" spc="-1" strike="noStrike">
-                <a:solidFill>
-                  <a:srgbClr val="000000"/>
-                </a:solidFill>
-                <a:uFill>
-                  <a:solidFill>
-                    <a:srgbClr val="ffffff"/>
-                  </a:solidFill>
-                </a:uFill>
-                <a:latin typeface="Arial"/>
-              </a:rPr>
-              <a:t>. </a:t>
-            </a:r>
-            <a:r>
-              <a:rPr b="0" lang="en-GB" sz="1800" spc="-1" strike="noStrike">
-                <a:solidFill>
-                  <a:srgbClr val="000000"/>
-                </a:solidFill>
-                <a:uFill>
-                  <a:solidFill>
-                    <a:srgbClr val="ffffff"/>
-                  </a:solidFill>
-                </a:uFill>
-                <a:latin typeface="Arial"/>
-              </a:rPr>
-              <a:t>m</a:t>
-            </a:r>
-            <a:r>
-              <a:rPr b="0" lang="en-GB" sz="1800" spc="-1" strike="noStrike">
-                <a:solidFill>
-                  <a:srgbClr val="000000"/>
-                </a:solidFill>
-                <a:uFill>
-                  <a:solidFill>
-                    <a:srgbClr val="ffffff"/>
-                  </a:solidFill>
-                </a:uFill>
-                <a:latin typeface="Arial"/>
-              </a:rPr>
-              <a:t>a</a:t>
-            </a:r>
-            <a:r>
-              <a:rPr b="0" lang="en-GB" sz="1800" spc="-1" strike="noStrike">
-                <a:solidFill>
-                  <a:srgbClr val="000000"/>
-                </a:solidFill>
-                <a:uFill>
-                  <a:solidFill>
-                    <a:srgbClr val="ffffff"/>
-                  </a:solidFill>
-                </a:uFill>
-                <a:latin typeface="Arial"/>
-              </a:rPr>
-              <a:t>p</a:t>
-            </a:r>
-            <a:r>
-              <a:rPr b="0" lang="en-GB" sz="1800" spc="-1" strike="noStrike">
-                <a:solidFill>
-                  <a:srgbClr val="000000"/>
-                </a:solidFill>
-                <a:uFill>
-                  <a:solidFill>
-                    <a:srgbClr val="ffffff"/>
-                  </a:solidFill>
-                </a:uFill>
-                <a:latin typeface="Arial"/>
-              </a:rPr>
-              <a:t>pi</a:t>
-            </a:r>
-            <a:r>
-              <a:rPr b="0" lang="en-GB" sz="1800" spc="-1" strike="noStrike">
-                <a:solidFill>
-                  <a:srgbClr val="000000"/>
-                </a:solidFill>
-                <a:uFill>
-                  <a:solidFill>
-                    <a:srgbClr val="ffffff"/>
-                  </a:solidFill>
-                </a:uFill>
-                <a:latin typeface="Arial"/>
-              </a:rPr>
-              <a:t>n</a:t>
-            </a:r>
-            <a:r>
-              <a:rPr b="0" lang="en-GB" sz="1800" spc="-1" strike="noStrike">
-                <a:solidFill>
-                  <a:srgbClr val="000000"/>
-                </a:solidFill>
-                <a:uFill>
-                  <a:solidFill>
-                    <a:srgbClr val="ffffff"/>
-                  </a:solidFill>
-                </a:uFill>
-                <a:latin typeface="Arial"/>
-              </a:rPr>
-              <a:t>g</a:t>
-            </a:r>
-            <a:r>
-              <a:rPr b="0" lang="en-GB" sz="1800" spc="-1" strike="noStrike">
-                <a:solidFill>
-                  <a:srgbClr val="000000"/>
-                </a:solidFill>
-                <a:uFill>
-                  <a:solidFill>
-                    <a:srgbClr val="ffffff"/>
-                  </a:solidFill>
-                </a:uFill>
-                <a:latin typeface="Arial"/>
-              </a:rPr>
-              <a:t>s </a:t>
-            </a:r>
-            <a:r>
-              <a:rPr b="0" lang="en-GB" sz="1800" spc="-1" strike="noStrike">
-                <a:solidFill>
-                  <a:srgbClr val="000000"/>
-                </a:solidFill>
-                <a:uFill>
-                  <a:solidFill>
-                    <a:srgbClr val="ffffff"/>
-                  </a:solidFill>
-                </a:uFill>
-                <a:latin typeface="Arial"/>
-              </a:rPr>
-              <a:t>t</a:t>
-            </a:r>
-            <a:r>
-              <a:rPr b="0" lang="en-GB" sz="1800" spc="-1" strike="noStrike">
-                <a:solidFill>
-                  <a:srgbClr val="000000"/>
-                </a:solidFill>
-                <a:uFill>
-                  <a:solidFill>
-                    <a:srgbClr val="ffffff"/>
-                  </a:solidFill>
-                </a:uFill>
-                <a:latin typeface="Arial"/>
-              </a:rPr>
-              <a:t>h</a:t>
-            </a:r>
-            <a:r>
-              <a:rPr b="0" lang="en-GB" sz="1800" spc="-1" strike="noStrike">
-                <a:solidFill>
-                  <a:srgbClr val="000000"/>
-                </a:solidFill>
-                <a:uFill>
-                  <a:solidFill>
-                    <a:srgbClr val="ffffff"/>
-                  </a:solidFill>
-                </a:uFill>
-                <a:latin typeface="Arial"/>
-              </a:rPr>
-              <a:t>a</a:t>
-            </a:r>
-            <a:r>
-              <a:rPr b="0" lang="en-GB" sz="1800" spc="-1" strike="noStrike">
-                <a:solidFill>
-                  <a:srgbClr val="000000"/>
-                </a:solidFill>
-                <a:uFill>
-                  <a:solidFill>
-                    <a:srgbClr val="ffffff"/>
-                  </a:solidFill>
-                </a:uFill>
-                <a:latin typeface="Arial"/>
-              </a:rPr>
-              <a:t>t </a:t>
-            </a:r>
-            <a:r>
-              <a:rPr b="0" lang="en-GB" sz="1800" spc="-1" strike="noStrike">
-                <a:solidFill>
-                  <a:srgbClr val="000000"/>
-                </a:solidFill>
-                <a:uFill>
-                  <a:solidFill>
-                    <a:srgbClr val="ffffff"/>
-                  </a:solidFill>
-                </a:uFill>
-                <a:latin typeface="Arial"/>
-              </a:rPr>
-              <a:t>p</a:t>
-            </a:r>
-            <a:r>
-              <a:rPr b="0" lang="en-GB" sz="1800" spc="-1" strike="noStrike">
-                <a:solidFill>
-                  <a:srgbClr val="000000"/>
-                </a:solidFill>
-                <a:uFill>
-                  <a:solidFill>
-                    <a:srgbClr val="ffffff"/>
-                  </a:solidFill>
-                </a:uFill>
-                <a:latin typeface="Arial"/>
-              </a:rPr>
-              <a:t>r</a:t>
-            </a:r>
-            <a:r>
-              <a:rPr b="0" lang="en-GB" sz="1800" spc="-1" strike="noStrike">
-                <a:solidFill>
-                  <a:srgbClr val="000000"/>
-                </a:solidFill>
-                <a:uFill>
-                  <a:solidFill>
-                    <a:srgbClr val="ffffff"/>
-                  </a:solidFill>
-                </a:uFill>
-                <a:latin typeface="Arial"/>
-              </a:rPr>
-              <a:t>e</a:t>
-            </a:r>
-            <a:r>
-              <a:rPr b="0" lang="en-GB" sz="1800" spc="-1" strike="noStrike">
-                <a:solidFill>
-                  <a:srgbClr val="000000"/>
-                </a:solidFill>
-                <a:uFill>
-                  <a:solidFill>
-                    <a:srgbClr val="ffffff"/>
-                  </a:solidFill>
-                </a:uFill>
-                <a:latin typeface="Arial"/>
-              </a:rPr>
-              <a:t>s</a:t>
-            </a:r>
-            <a:r>
-              <a:rPr b="0" lang="en-GB" sz="1800" spc="-1" strike="noStrike">
-                <a:solidFill>
-                  <a:srgbClr val="000000"/>
-                </a:solidFill>
-                <a:uFill>
-                  <a:solidFill>
-                    <a:srgbClr val="ffffff"/>
-                  </a:solidFill>
-                </a:uFill>
-                <a:latin typeface="Arial"/>
-              </a:rPr>
-              <a:t>e</a:t>
-            </a:r>
-            <a:r>
-              <a:rPr b="0" lang="en-GB" sz="1800" spc="-1" strike="noStrike">
-                <a:solidFill>
-                  <a:srgbClr val="000000"/>
-                </a:solidFill>
-                <a:uFill>
-                  <a:solidFill>
-                    <a:srgbClr val="ffffff"/>
-                  </a:solidFill>
-                </a:uFill>
-                <a:latin typeface="Arial"/>
-              </a:rPr>
-              <a:t>r</a:t>
-            </a:r>
-            <a:r>
-              <a:rPr b="0" lang="en-GB" sz="1800" spc="-1" strike="noStrike">
-                <a:solidFill>
-                  <a:srgbClr val="000000"/>
-                </a:solidFill>
-                <a:uFill>
-                  <a:solidFill>
-                    <a:srgbClr val="ffffff"/>
-                  </a:solidFill>
-                </a:uFill>
-                <a:latin typeface="Arial"/>
-              </a:rPr>
-              <a:t>v</a:t>
-            </a:r>
-            <a:r>
-              <a:rPr b="0" lang="en-GB" sz="1800" spc="-1" strike="noStrike">
-                <a:solidFill>
-                  <a:srgbClr val="000000"/>
-                </a:solidFill>
-                <a:uFill>
-                  <a:solidFill>
-                    <a:srgbClr val="ffffff"/>
-                  </a:solidFill>
-                </a:uFill>
-                <a:latin typeface="Arial"/>
-              </a:rPr>
-              <a:t>e </a:t>
-            </a:r>
-            <a:r>
-              <a:rPr b="0" lang="en-GB" sz="1800" spc="-1" strike="noStrike">
-                <a:solidFill>
-                  <a:srgbClr val="000000"/>
-                </a:solidFill>
-                <a:uFill>
-                  <a:solidFill>
-                    <a:srgbClr val="ffffff"/>
-                  </a:solidFill>
-                </a:uFill>
-                <a:latin typeface="Arial"/>
-              </a:rPr>
-              <a:t>T</a:t>
-            </a:r>
-            <a:endParaRPr b="0" lang="en-GB" sz="1800" spc="-1" strike="noStrike">
-              <a:solidFill>
-                <a:srgbClr val="000000"/>
-              </a:solidFill>
-              <a:uFill>
-                <a:solidFill>
-                  <a:srgbClr val="ffffff"/>
-                </a:solidFill>
-              </a:uFill>
-              <a:latin typeface="Arial"/>
-            </a:endParaRPr>
-          </a:p>
-          <a:p>
-            <a:pPr marL="216000" indent="-216000">
-              <a:buClr>
-                <a:srgbClr val="000000"/>
-              </a:buClr>
-              <a:buSzPct val="45000"/>
-              <a:buFont typeface="Wingdings" charset="2"/>
-              <a:buChar char=""/>
-            </a:pPr>
-            <a:r>
-              <a:rPr b="0" lang="en-GB" sz="1800" spc="-1" strike="noStrike">
-                <a:solidFill>
-                  <a:srgbClr val="000000"/>
-                </a:solidFill>
-                <a:uFill>
-                  <a:solidFill>
-                    <a:srgbClr val="ffffff"/>
-                  </a:solidFill>
-                </a:uFill>
-                <a:latin typeface="Arial"/>
-              </a:rPr>
-              <a:t> </a:t>
-            </a:r>
-            <a:endParaRPr b="0" lang="en-GB" sz="1800" spc="-1" strike="noStrike">
-              <a:solidFill>
-                <a:srgbClr val="000000"/>
-              </a:solidFill>
-              <a:uFill>
-                <a:solidFill>
-                  <a:srgbClr val="ffffff"/>
-                </a:solidFill>
-              </a:uFill>
-              <a:latin typeface="Arial"/>
-            </a:endParaRPr>
-          </a:p>
-          <a:p>
-            <a:pPr marL="216000" indent="-216000">
-              <a:buClr>
-                <a:srgbClr val="000000"/>
-              </a:buClr>
-              <a:buSzPct val="45000"/>
-              <a:buFont typeface="Wingdings" charset="2"/>
-              <a:buChar char=""/>
-            </a:pPr>
-            <a:r>
-              <a:rPr b="0" lang="en-GB" sz="1800" spc="-1" strike="noStrike">
-                <a:solidFill>
-                  <a:srgbClr val="000000"/>
-                </a:solidFill>
-                <a:uFill>
-                  <a:solidFill>
-                    <a:srgbClr val="ffffff"/>
-                  </a:solidFill>
-                </a:uFill>
-                <a:latin typeface="Arial"/>
-              </a:rPr>
-              <a:t>C</a:t>
-            </a:r>
-            <a:r>
-              <a:rPr b="0" lang="en-GB" sz="1800" spc="-1" strike="noStrike">
-                <a:solidFill>
-                  <a:srgbClr val="000000"/>
-                </a:solidFill>
-                <a:uFill>
-                  <a:solidFill>
-                    <a:srgbClr val="ffffff"/>
-                  </a:solidFill>
-                </a:uFill>
-                <a:latin typeface="Arial"/>
-              </a:rPr>
-              <a:t>al</a:t>
-            </a:r>
-            <a:r>
-              <a:rPr b="0" lang="en-GB" sz="1800" spc="-1" strike="noStrike">
-                <a:solidFill>
-                  <a:srgbClr val="000000"/>
-                </a:solidFill>
-                <a:uFill>
-                  <a:solidFill>
-                    <a:srgbClr val="ffffff"/>
-                  </a:solidFill>
-                </a:uFill>
-                <a:latin typeface="Arial"/>
-              </a:rPr>
-              <a:t>c</a:t>
-            </a:r>
-            <a:r>
-              <a:rPr b="0" lang="en-GB" sz="1800" spc="-1" strike="noStrike">
-                <a:solidFill>
-                  <a:srgbClr val="000000"/>
-                </a:solidFill>
-                <a:uFill>
-                  <a:solidFill>
-                    <a:srgbClr val="ffffff"/>
-                  </a:solidFill>
-                </a:uFill>
-                <a:latin typeface="Arial"/>
-              </a:rPr>
-              <a:t>ul</a:t>
-            </a:r>
-            <a:r>
-              <a:rPr b="0" lang="en-GB" sz="1800" spc="-1" strike="noStrike">
-                <a:solidFill>
-                  <a:srgbClr val="000000"/>
-                </a:solidFill>
-                <a:uFill>
-                  <a:solidFill>
-                    <a:srgbClr val="ffffff"/>
-                  </a:solidFill>
-                </a:uFill>
-                <a:latin typeface="Arial"/>
-              </a:rPr>
-              <a:t>a</a:t>
-            </a:r>
-            <a:r>
-              <a:rPr b="0" lang="en-GB" sz="1800" spc="-1" strike="noStrike">
-                <a:solidFill>
-                  <a:srgbClr val="000000"/>
-                </a:solidFill>
-                <a:uFill>
-                  <a:solidFill>
-                    <a:srgbClr val="ffffff"/>
-                  </a:solidFill>
-                </a:uFill>
-                <a:latin typeface="Arial"/>
-              </a:rPr>
-              <a:t>ti</a:t>
-            </a:r>
-            <a:r>
-              <a:rPr b="0" lang="en-GB" sz="1800" spc="-1" strike="noStrike">
-                <a:solidFill>
-                  <a:srgbClr val="000000"/>
-                </a:solidFill>
-                <a:uFill>
-                  <a:solidFill>
-                    <a:srgbClr val="ffffff"/>
-                  </a:solidFill>
-                </a:uFill>
-                <a:latin typeface="Arial"/>
-              </a:rPr>
-              <a:t>n</a:t>
-            </a:r>
-            <a:r>
-              <a:rPr b="0" lang="en-GB" sz="1800" spc="-1" strike="noStrike">
-                <a:solidFill>
-                  <a:srgbClr val="000000"/>
-                </a:solidFill>
-                <a:uFill>
-                  <a:solidFill>
-                    <a:srgbClr val="ffffff"/>
-                  </a:solidFill>
-                </a:uFill>
-                <a:latin typeface="Arial"/>
-              </a:rPr>
-              <a:t>g </a:t>
-            </a:r>
-            <a:r>
-              <a:rPr b="0" lang="en-GB" sz="1800" spc="-1" strike="noStrike">
-                <a:solidFill>
-                  <a:srgbClr val="000000"/>
-                </a:solidFill>
-                <a:uFill>
-                  <a:solidFill>
-                    <a:srgbClr val="ffffff"/>
-                  </a:solidFill>
-                </a:uFill>
-                <a:latin typeface="Arial"/>
-              </a:rPr>
-              <a:t>B</a:t>
-            </a:r>
-            <a:r>
-              <a:rPr b="0" lang="en-GB" sz="1800" spc="-1" strike="noStrike" baseline="101000">
-                <a:solidFill>
-                  <a:srgbClr val="000000"/>
-                </a:solidFill>
-                <a:uFill>
-                  <a:solidFill>
-                    <a:srgbClr val="ffffff"/>
-                  </a:solidFill>
-                </a:uFill>
-                <a:latin typeface="Arial"/>
-              </a:rPr>
-              <a:t>A</a:t>
-            </a:r>
-            <a:r>
-              <a:rPr b="0" lang="en-GB" sz="1800" spc="-1" strike="noStrike">
-                <a:solidFill>
-                  <a:srgbClr val="000000"/>
-                </a:solidFill>
-                <a:uFill>
-                  <a:solidFill>
-                    <a:srgbClr val="ffffff"/>
-                  </a:solidFill>
-                </a:uFill>
-                <a:latin typeface="Arial"/>
-              </a:rPr>
-              <a:t> </a:t>
-            </a:r>
-            <a:r>
-              <a:rPr b="0" lang="en-GB" sz="1800" spc="-1" strike="noStrike">
-                <a:solidFill>
-                  <a:srgbClr val="000000"/>
-                </a:solidFill>
-                <a:uFill>
-                  <a:solidFill>
-                    <a:srgbClr val="ffffff"/>
-                  </a:solidFill>
-                </a:uFill>
-                <a:latin typeface="Arial"/>
-              </a:rPr>
-              <a:t>is </a:t>
-            </a:r>
-            <a:r>
-              <a:rPr b="0" lang="en-GB" sz="1800" spc="-1" strike="noStrike">
-                <a:solidFill>
-                  <a:srgbClr val="000000"/>
-                </a:solidFill>
-                <a:uFill>
-                  <a:solidFill>
-                    <a:srgbClr val="ffffff"/>
-                  </a:solidFill>
-                </a:uFill>
-                <a:latin typeface="Arial"/>
-              </a:rPr>
-              <a:t>m</a:t>
-            </a:r>
-            <a:r>
-              <a:rPr b="0" lang="en-GB" sz="1800" spc="-1" strike="noStrike">
-                <a:solidFill>
-                  <a:srgbClr val="000000"/>
-                </a:solidFill>
-                <a:uFill>
-                  <a:solidFill>
-                    <a:srgbClr val="ffffff"/>
-                  </a:solidFill>
-                </a:uFill>
-                <a:latin typeface="Arial"/>
-              </a:rPr>
-              <a:t>o</a:t>
-            </a:r>
-            <a:r>
-              <a:rPr b="0" lang="en-GB" sz="1800" spc="-1" strike="noStrike">
-                <a:solidFill>
-                  <a:srgbClr val="000000"/>
-                </a:solidFill>
-                <a:uFill>
-                  <a:solidFill>
-                    <a:srgbClr val="ffffff"/>
-                  </a:solidFill>
-                </a:uFill>
-                <a:latin typeface="Arial"/>
-              </a:rPr>
-              <a:t>n</a:t>
-            </a:r>
-            <a:r>
-              <a:rPr b="0" lang="en-GB" sz="1800" spc="-1" strike="noStrike">
-                <a:solidFill>
-                  <a:srgbClr val="000000"/>
-                </a:solidFill>
-                <a:uFill>
-                  <a:solidFill>
-                    <a:srgbClr val="ffffff"/>
-                  </a:solidFill>
-                </a:uFill>
-                <a:latin typeface="Arial"/>
-              </a:rPr>
-              <a:t>st</a:t>
-            </a:r>
-            <a:r>
-              <a:rPr b="0" lang="en-GB" sz="1800" spc="-1" strike="noStrike">
-                <a:solidFill>
-                  <a:srgbClr val="000000"/>
-                </a:solidFill>
-                <a:uFill>
-                  <a:solidFill>
-                    <a:srgbClr val="ffffff"/>
-                  </a:solidFill>
-                </a:uFill>
-                <a:latin typeface="Arial"/>
-              </a:rPr>
-              <a:t>r</a:t>
-            </a:r>
-            <a:r>
-              <a:rPr b="0" lang="en-GB" sz="1800" spc="-1" strike="noStrike">
-                <a:solidFill>
-                  <a:srgbClr val="000000"/>
-                </a:solidFill>
-                <a:uFill>
-                  <a:solidFill>
-                    <a:srgbClr val="ffffff"/>
-                  </a:solidFill>
-                </a:uFill>
-                <a:latin typeface="Arial"/>
-              </a:rPr>
-              <a:t>o</a:t>
-            </a:r>
-            <a:r>
-              <a:rPr b="0" lang="en-GB" sz="1800" spc="-1" strike="noStrike">
-                <a:solidFill>
-                  <a:srgbClr val="000000"/>
-                </a:solidFill>
-                <a:uFill>
-                  <a:solidFill>
-                    <a:srgbClr val="ffffff"/>
-                  </a:solidFill>
-                </a:uFill>
-                <a:latin typeface="Arial"/>
-              </a:rPr>
-              <a:t>u</a:t>
-            </a:r>
-            <a:r>
-              <a:rPr b="0" lang="en-GB" sz="1800" spc="-1" strike="noStrike">
-                <a:solidFill>
-                  <a:srgbClr val="000000"/>
-                </a:solidFill>
-                <a:uFill>
-                  <a:solidFill>
-                    <a:srgbClr val="ffffff"/>
-                  </a:solidFill>
-                </a:uFill>
-                <a:latin typeface="Arial"/>
-              </a:rPr>
-              <a:t>sl</a:t>
-            </a:r>
-            <a:r>
-              <a:rPr b="0" lang="en-GB" sz="1800" spc="-1" strike="noStrike">
-                <a:solidFill>
-                  <a:srgbClr val="000000"/>
-                </a:solidFill>
-                <a:uFill>
-                  <a:solidFill>
-                    <a:srgbClr val="ffffff"/>
-                  </a:solidFill>
-                </a:uFill>
-                <a:latin typeface="Arial"/>
-              </a:rPr>
-              <a:t>y </a:t>
-            </a:r>
-            <a:r>
-              <a:rPr b="0" lang="en-GB" sz="1800" spc="-1" strike="noStrike">
-                <a:solidFill>
-                  <a:srgbClr val="000000"/>
-                </a:solidFill>
-                <a:uFill>
-                  <a:solidFill>
-                    <a:srgbClr val="ffffff"/>
-                  </a:solidFill>
-                </a:uFill>
-                <a:latin typeface="Arial"/>
-              </a:rPr>
-              <a:t>in</a:t>
-            </a:r>
-            <a:r>
-              <a:rPr b="0" lang="en-GB" sz="1800" spc="-1" strike="noStrike">
-                <a:solidFill>
-                  <a:srgbClr val="000000"/>
-                </a:solidFill>
-                <a:uFill>
-                  <a:solidFill>
-                    <a:srgbClr val="ffffff"/>
-                  </a:solidFill>
-                </a:uFill>
-                <a:latin typeface="Arial"/>
-              </a:rPr>
-              <a:t>ef</a:t>
-            </a:r>
-            <a:r>
-              <a:rPr b="0" lang="en-GB" sz="1800" spc="-1" strike="noStrike">
-                <a:solidFill>
-                  <a:srgbClr val="000000"/>
-                </a:solidFill>
-                <a:uFill>
-                  <a:solidFill>
-                    <a:srgbClr val="ffffff"/>
-                  </a:solidFill>
-                </a:uFill>
-                <a:latin typeface="Arial"/>
-              </a:rPr>
-              <a:t>fi</a:t>
-            </a:r>
-            <a:r>
-              <a:rPr b="0" lang="en-GB" sz="1800" spc="-1" strike="noStrike">
-                <a:solidFill>
-                  <a:srgbClr val="000000"/>
-                </a:solidFill>
-                <a:uFill>
-                  <a:solidFill>
-                    <a:srgbClr val="ffffff"/>
-                  </a:solidFill>
-                </a:uFill>
-                <a:latin typeface="Arial"/>
-              </a:rPr>
-              <a:t>ci</a:t>
-            </a:r>
-            <a:r>
-              <a:rPr b="0" lang="en-GB" sz="1800" spc="-1" strike="noStrike">
-                <a:solidFill>
-                  <a:srgbClr val="000000"/>
-                </a:solidFill>
-                <a:uFill>
-                  <a:solidFill>
-                    <a:srgbClr val="ffffff"/>
-                  </a:solidFill>
-                </a:uFill>
-                <a:latin typeface="Arial"/>
-              </a:rPr>
-              <a:t>e</a:t>
-            </a:r>
-            <a:r>
-              <a:rPr b="0" lang="en-GB" sz="1800" spc="-1" strike="noStrike">
-                <a:solidFill>
-                  <a:srgbClr val="000000"/>
-                </a:solidFill>
-                <a:uFill>
-                  <a:solidFill>
-                    <a:srgbClr val="ffffff"/>
-                  </a:solidFill>
-                </a:uFill>
-                <a:latin typeface="Arial"/>
-              </a:rPr>
-              <a:t>n</a:t>
-            </a:r>
-            <a:r>
-              <a:rPr b="0" lang="en-GB" sz="1800" spc="-1" strike="noStrike">
-                <a:solidFill>
-                  <a:srgbClr val="000000"/>
-                </a:solidFill>
-                <a:uFill>
-                  <a:solidFill>
-                    <a:srgbClr val="ffffff"/>
-                  </a:solidFill>
-                </a:uFill>
-                <a:latin typeface="Arial"/>
-              </a:rPr>
-              <a:t>t</a:t>
+              <a:t>mo</a:t>
+            </a:r>
+            <a:r>
+              <a:rPr b="0" lang="en-GB" sz="1800" spc="-1" strike="noStrike">
+                <a:solidFill>
+                  <a:srgbClr val="000000"/>
+                </a:solidFill>
+                <a:uFill>
+                  <a:solidFill>
+                    <a:srgbClr val="ffffff"/>
+                  </a:solidFill>
+                </a:uFill>
+                <a:latin typeface="Arial"/>
+              </a:rPr>
+              <a:t>nstr</a:t>
+            </a:r>
+            <a:r>
+              <a:rPr b="0" lang="en-GB" sz="1800" spc="-1" strike="noStrike">
+                <a:solidFill>
+                  <a:srgbClr val="000000"/>
+                </a:solidFill>
+                <a:uFill>
+                  <a:solidFill>
+                    <a:srgbClr val="ffffff"/>
+                  </a:solidFill>
+                </a:uFill>
+                <a:latin typeface="Arial"/>
+              </a:rPr>
+              <a:t>ous</a:t>
+            </a:r>
+            <a:r>
+              <a:rPr b="0" lang="en-GB" sz="1800" spc="-1" strike="noStrike">
+                <a:solidFill>
+                  <a:srgbClr val="000000"/>
+                </a:solidFill>
+                <a:uFill>
+                  <a:solidFill>
+                    <a:srgbClr val="ffffff"/>
+                  </a:solidFill>
+                </a:uFill>
+                <a:latin typeface="Arial"/>
+              </a:rPr>
+              <a:t>ly </a:t>
+            </a:r>
+            <a:r>
+              <a:rPr b="0" lang="en-GB" sz="1800" spc="-1" strike="noStrike">
+                <a:solidFill>
+                  <a:srgbClr val="000000"/>
+                </a:solidFill>
+                <a:uFill>
+                  <a:solidFill>
+                    <a:srgbClr val="ffffff"/>
+                  </a:solidFill>
+                </a:uFill>
+                <a:latin typeface="Arial"/>
+              </a:rPr>
+              <a:t>inef</a:t>
+            </a:r>
+            <a:r>
+              <a:rPr b="0" lang="en-GB" sz="1800" spc="-1" strike="noStrike">
+                <a:solidFill>
+                  <a:srgbClr val="000000"/>
+                </a:solidFill>
+                <a:uFill>
+                  <a:solidFill>
+                    <a:srgbClr val="ffffff"/>
+                  </a:solidFill>
+                </a:uFill>
+                <a:latin typeface="Arial"/>
+              </a:rPr>
+              <a:t>ficie</a:t>
+            </a:r>
+            <a:r>
+              <a:rPr b="0" lang="en-GB" sz="1800" spc="-1" strike="noStrike">
+                <a:solidFill>
+                  <a:srgbClr val="000000"/>
+                </a:solidFill>
+                <a:uFill>
+                  <a:solidFill>
+                    <a:srgbClr val="ffffff"/>
+                  </a:solidFill>
+                </a:uFill>
+                <a:latin typeface="Arial"/>
+              </a:rPr>
+              <a:t>nt</a:t>
             </a:r>
             <a:endParaRPr b="0" lang="en-GB" sz="1800" spc="-1" strike="noStrike">
               <a:solidFill>

</xml_diff>